<commit_message>
Regenerate all PPTX decks: corrected OAuth flow, consistent model names, accurate pricing
</commit_message>
<xml_diff>
--- a/developer/session-2/session-2-prompting-multimodal.pptx
+++ b/developer/session-2/session-2-prompting-multimodal.pptx
@@ -6,7 +6,7 @@
   </p:sldMasterIdLst>
   <p:sldIdLst>
     <p:sldId id="256" r:id="rId7"/>
-    <p:sldId id="257" r:id="rId8"/>
+    <p:sldId id="257" r:id="rId9"/>
     <p:sldId id="258" r:id="rId10"/>
     <p:sldId id="259" r:id="rId11"/>
     <p:sldId id="260" r:id="rId12"/>
@@ -17,6 +17,9 @@
     <p:sldId id="265" r:id="rId17"/>
     <p:sldId id="266" r:id="rId18"/>
     <p:sldId id="267" r:id="rId19"/>
+    <p:sldId id="268" r:id="rId20"/>
+    <p:sldId id="269" r:id="rId21"/>
+    <p:sldId id="270" r:id="rId22"/>
   </p:sldIdLst>
   <p:sldSz cx="12191695" cy="6858000" type="screen4x3"/>
   <p:notesSz cx="6858000" cy="9144000"/>
@@ -513,7 +516,7 @@
           <a:lstStyle/>
           <a:p>
             <a:r>
-              <a:t>System prompt sets persona, constraints, output format. Three providers, three places to put it. Be specific: don't say 'be helpful', say 'You are a senior Python developer. Answer only with code.'</a:t>
+              <a:t>Welcome to Session 2. System prompts, JSON schemas, vision, audio, and image generation</a:t>
             </a:r>
           </a:p>
         </p:txBody>
@@ -583,7 +586,357 @@
           <a:lstStyle/>
           <a:p>
             <a:r>
-              <a:t>Combines multimodal input, structured output, and comparing providers.</a:t>
+              <a:t>Anthropic vision: image block with explicit media_type. Supports JPEG, PNG, GIF, WebP.</a:t>
+            </a:r>
+          </a:p>
+        </p:txBody>
+      </p:sp>
+      <p:sp>
+        <p:nvSpPr>
+          <p:cNvPr id="4" name="Slide Number Placeholder 3"/>
+          <p:cNvSpPr>
+            <a:spLocks noGrp="1"/>
+          </p:cNvSpPr>
+          <p:nvPr>
+            <p:ph type="sldNum" idx="5" sz="quarter"/>
+          </p:nvPr>
+        </p:nvSpPr>
+        <p:spPr/>
+      </p:sp>
+    </p:spTree>
+  </p:cSld>
+  <p:clrMapOvr>
+    <a:masterClrMapping/>
+  </p:clrMapOvr>
+</p:notes>
+</file>
+
+<file path=ppt/notesSlides/notesSlide11.xml><?xml version="1.0" encoding="utf-8"?>
+<p:notes xmlns:a="http://schemas.openxmlformats.org/drawingml/2006/main" xmlns:p="http://schemas.openxmlformats.org/presentationml/2006/main" xmlns:r="http://schemas.openxmlformats.org/officeDocument/2006/relationships">
+  <p:cSld>
+    <p:spTree>
+      <p:nvGrpSpPr>
+        <p:cNvPr id="1" name=""/>
+        <p:cNvGrpSpPr/>
+        <p:nvPr/>
+      </p:nvGrpSpPr>
+      <p:grpSpPr>
+        <a:xfrm>
+          <a:off x="0" y="0"/>
+          <a:ext cx="0" cy="0"/>
+          <a:chOff x="0" y="0"/>
+          <a:chExt cx="0" cy="0"/>
+        </a:xfrm>
+      </p:grpSpPr>
+      <p:sp>
+        <p:nvSpPr>
+          <p:cNvPr id="2" name="Slide Image Placeholder 1"/>
+          <p:cNvSpPr>
+            <a:spLocks noGrp="1"/>
+          </p:cNvSpPr>
+          <p:nvPr>
+            <p:ph type="sldImg" idx="2"/>
+          </p:nvPr>
+        </p:nvSpPr>
+        <p:spPr/>
+      </p:sp>
+      <p:sp>
+        <p:nvSpPr>
+          <p:cNvPr id="3" name="Notes Placeholder 2"/>
+          <p:cNvSpPr>
+            <a:spLocks noGrp="1"/>
+          </p:cNvSpPr>
+          <p:nvPr>
+            <p:ph type="body" idx="3" sz="quarter"/>
+          </p:nvPr>
+        </p:nvSpPr>
+        <p:spPr/>
+        <p:txBody>
+          <a:bodyPr/>
+          <a:lstStyle/>
+          <a:p>
+            <a:r>
+              <a:t>Audio APIs are mature. Whisper is excellent for transcription. TTS voices are natural-sounding.</a:t>
+            </a:r>
+          </a:p>
+        </p:txBody>
+      </p:sp>
+      <p:sp>
+        <p:nvSpPr>
+          <p:cNvPr id="4" name="Slide Number Placeholder 3"/>
+          <p:cNvSpPr>
+            <a:spLocks noGrp="1"/>
+          </p:cNvSpPr>
+          <p:nvPr>
+            <p:ph type="sldNum" idx="5" sz="quarter"/>
+          </p:nvPr>
+        </p:nvSpPr>
+        <p:spPr/>
+      </p:sp>
+    </p:spTree>
+  </p:cSld>
+  <p:clrMapOvr>
+    <a:masterClrMapping/>
+  </p:clrMapOvr>
+</p:notes>
+</file>
+
+<file path=ppt/notesSlides/notesSlide12.xml><?xml version="1.0" encoding="utf-8"?>
+<p:notes xmlns:a="http://schemas.openxmlformats.org/drawingml/2006/main" xmlns:p="http://schemas.openxmlformats.org/presentationml/2006/main" xmlns:r="http://schemas.openxmlformats.org/officeDocument/2006/relationships">
+  <p:cSld>
+    <p:spTree>
+      <p:nvGrpSpPr>
+        <p:cNvPr id="1" name=""/>
+        <p:cNvGrpSpPr/>
+        <p:nvPr/>
+      </p:nvGrpSpPr>
+      <p:grpSpPr>
+        <a:xfrm>
+          <a:off x="0" y="0"/>
+          <a:ext cx="0" cy="0"/>
+          <a:chOff x="0" y="0"/>
+          <a:chExt cx="0" cy="0"/>
+        </a:xfrm>
+      </p:grpSpPr>
+      <p:sp>
+        <p:nvSpPr>
+          <p:cNvPr id="2" name="Slide Image Placeholder 1"/>
+          <p:cNvSpPr>
+            <a:spLocks noGrp="1"/>
+          </p:cNvSpPr>
+          <p:nvPr>
+            <p:ph type="sldImg" idx="2"/>
+          </p:nvPr>
+        </p:nvSpPr>
+        <p:spPr/>
+      </p:sp>
+      <p:sp>
+        <p:nvSpPr>
+          <p:cNvPr id="3" name="Notes Placeholder 2"/>
+          <p:cNvSpPr>
+            <a:spLocks noGrp="1"/>
+          </p:cNvSpPr>
+          <p:nvPr>
+            <p:ph type="body" idx="3" sz="quarter"/>
+          </p:nvPr>
+        </p:nvSpPr>
+        <p:spPr/>
+        <p:txBody>
+          <a:bodyPr/>
+          <a:lstStyle/>
+          <a:p>
+            <a:r>
+              <a:t>Image gen is powerful but costs add up. Show the generate_image function from multimodal_app.py.</a:t>
+            </a:r>
+          </a:p>
+        </p:txBody>
+      </p:sp>
+      <p:sp>
+        <p:nvSpPr>
+          <p:cNvPr id="4" name="Slide Number Placeholder 3"/>
+          <p:cNvSpPr>
+            <a:spLocks noGrp="1"/>
+          </p:cNvSpPr>
+          <p:nvPr>
+            <p:ph type="sldNum" idx="5" sz="quarter"/>
+          </p:nvPr>
+        </p:nvSpPr>
+        <p:spPr/>
+      </p:sp>
+    </p:spTree>
+  </p:cSld>
+  <p:clrMapOvr>
+    <a:masterClrMapping/>
+  </p:clrMapOvr>
+</p:notes>
+</file>
+
+<file path=ppt/notesSlides/notesSlide13.xml><?xml version="1.0" encoding="utf-8"?>
+<p:notes xmlns:a="http://schemas.openxmlformats.org/drawingml/2006/main" xmlns:p="http://schemas.openxmlformats.org/presentationml/2006/main" xmlns:r="http://schemas.openxmlformats.org/officeDocument/2006/relationships">
+  <p:cSld>
+    <p:spTree>
+      <p:nvGrpSpPr>
+        <p:cNvPr id="1" name=""/>
+        <p:cNvGrpSpPr/>
+        <p:nvPr/>
+      </p:nvGrpSpPr>
+      <p:grpSpPr>
+        <a:xfrm>
+          <a:off x="0" y="0"/>
+          <a:ext cx="0" cy="0"/>
+          <a:chOff x="0" y="0"/>
+          <a:chExt cx="0" cy="0"/>
+        </a:xfrm>
+      </p:grpSpPr>
+      <p:sp>
+        <p:nvSpPr>
+          <p:cNvPr id="2" name="Slide Image Placeholder 1"/>
+          <p:cNvSpPr>
+            <a:spLocks noGrp="1"/>
+          </p:cNvSpPr>
+          <p:nvPr>
+            <p:ph type="sldImg" idx="2"/>
+          </p:nvPr>
+        </p:nvSpPr>
+        <p:spPr/>
+      </p:sp>
+      <p:sp>
+        <p:nvSpPr>
+          <p:cNvPr id="3" name="Notes Placeholder 2"/>
+          <p:cNvSpPr>
+            <a:spLocks noGrp="1"/>
+          </p:cNvSpPr>
+          <p:nvPr>
+            <p:ph type="body" idx="3" sz="quarter"/>
+          </p:nvPr>
+        </p:nvSpPr>
+        <p:spPr/>
+        <p:txBody>
+          <a:bodyPr/>
+          <a:lstStyle/>
+          <a:p>
+            <a:r>
+              <a:t>Image gen and TTS in one slide. Both are simple API calls.</a:t>
+            </a:r>
+          </a:p>
+        </p:txBody>
+      </p:sp>
+      <p:sp>
+        <p:nvSpPr>
+          <p:cNvPr id="4" name="Slide Number Placeholder 3"/>
+          <p:cNvSpPr>
+            <a:spLocks noGrp="1"/>
+          </p:cNvSpPr>
+          <p:nvPr>
+            <p:ph type="sldNum" idx="5" sz="quarter"/>
+          </p:nvPr>
+        </p:nvSpPr>
+        <p:spPr/>
+      </p:sp>
+    </p:spTree>
+  </p:cSld>
+  <p:clrMapOvr>
+    <a:masterClrMapping/>
+  </p:clrMapOvr>
+</p:notes>
+</file>
+
+<file path=ppt/notesSlides/notesSlide14.xml><?xml version="1.0" encoding="utf-8"?>
+<p:notes xmlns:a="http://schemas.openxmlformats.org/drawingml/2006/main" xmlns:p="http://schemas.openxmlformats.org/presentationml/2006/main" xmlns:r="http://schemas.openxmlformats.org/officeDocument/2006/relationships">
+  <p:cSld>
+    <p:spTree>
+      <p:nvGrpSpPr>
+        <p:cNvPr id="1" name=""/>
+        <p:cNvGrpSpPr/>
+        <p:nvPr/>
+      </p:nvGrpSpPr>
+      <p:grpSpPr>
+        <a:xfrm>
+          <a:off x="0" y="0"/>
+          <a:ext cx="0" cy="0"/>
+          <a:chOff x="0" y="0"/>
+          <a:chExt cx="0" cy="0"/>
+        </a:xfrm>
+      </p:grpSpPr>
+      <p:sp>
+        <p:nvSpPr>
+          <p:cNvPr id="2" name="Slide Image Placeholder 1"/>
+          <p:cNvSpPr>
+            <a:spLocks noGrp="1"/>
+          </p:cNvSpPr>
+          <p:nvPr>
+            <p:ph type="sldImg" idx="2"/>
+          </p:nvPr>
+        </p:nvSpPr>
+        <p:spPr/>
+      </p:sp>
+      <p:sp>
+        <p:nvSpPr>
+          <p:cNvPr id="3" name="Notes Placeholder 2"/>
+          <p:cNvSpPr>
+            <a:spLocks noGrp="1"/>
+          </p:cNvSpPr>
+          <p:nvPr>
+            <p:ph type="body" idx="3" sz="quarter"/>
+          </p:nvPr>
+        </p:nvSpPr>
+        <p:spPr/>
+        <p:txBody>
+          <a:bodyPr/>
+          <a:lstStyle/>
+          <a:p>
+            <a:r>
+              <a:t>Hands-on exercise. Students need an image file and API keys for all 3 providers.</a:t>
+            </a:r>
+          </a:p>
+        </p:txBody>
+      </p:sp>
+      <p:sp>
+        <p:nvSpPr>
+          <p:cNvPr id="4" name="Slide Number Placeholder 3"/>
+          <p:cNvSpPr>
+            <a:spLocks noGrp="1"/>
+          </p:cNvSpPr>
+          <p:nvPr>
+            <p:ph type="sldNum" idx="5" sz="quarter"/>
+          </p:nvPr>
+        </p:nvSpPr>
+        <p:spPr/>
+      </p:sp>
+    </p:spTree>
+  </p:cSld>
+  <p:clrMapOvr>
+    <a:masterClrMapping/>
+  </p:clrMapOvr>
+</p:notes>
+</file>
+
+<file path=ppt/notesSlides/notesSlide15.xml><?xml version="1.0" encoding="utf-8"?>
+<p:notes xmlns:a="http://schemas.openxmlformats.org/drawingml/2006/main" xmlns:p="http://schemas.openxmlformats.org/presentationml/2006/main" xmlns:r="http://schemas.openxmlformats.org/officeDocument/2006/relationships">
+  <p:cSld>
+    <p:spTree>
+      <p:nvGrpSpPr>
+        <p:cNvPr id="1" name=""/>
+        <p:cNvGrpSpPr/>
+        <p:nvPr/>
+      </p:nvGrpSpPr>
+      <p:grpSpPr>
+        <a:xfrm>
+          <a:off x="0" y="0"/>
+          <a:ext cx="0" cy="0"/>
+          <a:chOff x="0" y="0"/>
+          <a:chExt cx="0" cy="0"/>
+        </a:xfrm>
+      </p:grpSpPr>
+      <p:sp>
+        <p:nvSpPr>
+          <p:cNvPr id="2" name="Slide Image Placeholder 1"/>
+          <p:cNvSpPr>
+            <a:spLocks noGrp="1"/>
+          </p:cNvSpPr>
+          <p:nvPr>
+            <p:ph type="sldImg" idx="2"/>
+          </p:nvPr>
+        </p:nvSpPr>
+        <p:spPr/>
+      </p:sp>
+      <p:sp>
+        <p:nvSpPr>
+          <p:cNvPr id="3" name="Notes Placeholder 2"/>
+          <p:cNvSpPr>
+            <a:spLocks noGrp="1"/>
+          </p:cNvSpPr>
+          <p:nvPr>
+            <p:ph type="body" idx="3" sz="quarter"/>
+          </p:nvPr>
+        </p:nvSpPr>
+        <p:spPr/>
+        <p:txBody>
+          <a:bodyPr/>
+          <a:lstStyle/>
+          <a:p>
+            <a:r>
+              <a:t>Recap. Preview Session 3 on tool use.</a:t>
             </a:r>
           </a:p>
         </p:txBody>
@@ -653,7 +1006,7 @@
           <a:lstStyle/>
           <a:p>
             <a:r>
-              <a:t>Being specific is obvious but most people don't do it. Few-shot examples are incredibly powerful. Chain-of-thought works. Negative constraints — what NOT to do — often more effective than positive.</a:t>
+              <a:t>Core prompting techniques. These work across all providers. Temperature is the most important parameter after the prompt itself.</a:t>
             </a:r>
           </a:p>
         </p:txBody>
@@ -723,7 +1076,7 @@
           <a:lstStyle/>
           <a:p>
             <a:r>
-              <a:t>Role stacking gives multiple perspectives from one call. XML tags are particularly effective with Claude.</a:t>
+              <a:t>System prompts are your primary control mechanism. Show examples of good vs bad system prompts.</a:t>
             </a:r>
           </a:p>
         </p:txBody>
@@ -793,7 +1146,7 @@
           <a:lstStyle/>
           <a:p>
             <a:r>
-              <a:t>LLMs output text. You need data. This is a solved problem in 2026 but you must use the right tools.</a:t>
+              <a:t>OpenAI has the cleanest structured output. Anthropic uses the tool-use trick. Both work well.</a:t>
             </a:r>
           </a:p>
         </p:txBody>
@@ -863,7 +1216,7 @@
           <a:lstStyle/>
           <a:p>
             <a:r>
-              <a:t>Define a Pydantic model, pass as response_format, get parsed Python objects back. Guaranteed schema match via constrained decoding.</a:t>
+              <a:t>Native structured output with Pydantic. The .parse() method returns a typed object. No JSON parsing needed.</a:t>
             </a:r>
           </a:p>
         </p:txBody>
@@ -933,7 +1286,7 @@
           <a:lstStyle/>
           <a:p>
             <a:r>
-              <a:t>Anthropic: use tool use trick with tool_choice to force schema. Google: response_mime_type + response_schema. Pydantic is the universal schema language.</a:t>
+              <a:t>Anthropic doesn't have native structured output — this tool-use trick is the standard workaround.</a:t>
             </a:r>
           </a:p>
         </p:txBody>
@@ -1003,7 +1356,7 @@
           <a:lstStyle/>
           <a:p>
             <a:r>
-              <a:t>Use Enums for fixed sets, Field descriptions to guide the model, Optional for conditional fields, nested models for complex structures. Works with all providers.</a:t>
+              <a:t>Gemini uses response_mime_type + response_schema. Clean approach similar to OpenAI.</a:t>
             </a:r>
           </a:p>
         </p:txBody>
@@ -1073,7 +1426,7 @@
           <a:lstStyle/>
           <a:p>
             <a:r>
-              <a:t>All three support vision. Google Gemini 3 Pro is natively multimodal — handles text+image+audio+video in one call. Use for: screenshots, document extraction, chart reading, content moderation.</a:t>
+              <a:t>Vision is now standard across all providers. Show the different content formats.</a:t>
             </a:r>
           </a:p>
         </p:txBody>
@@ -1143,7 +1496,7 @@
           <a:lstStyle/>
           <a:p>
             <a:r>
-              <a:t>Audio is two-way: Whisper transcribes, TTS generates. Gemini handles audio natively. Image gen: DALL-E 3 or Imagen 3. Anthropic focuses on text/analysis only.</a:t>
+              <a:t>OpenAI vision: mix text and image_url in the content array. Works with base64 or public URLs.</a:t>
             </a:r>
           </a:p>
         </p:txBody>
@@ -4165,8 +4518,8 @@
         </p:nvSpPr>
         <p:spPr>
           <a:xfrm>
-            <a:off x="914400" y="731520"/>
-            <a:ext cx="10058400" cy="548640"/>
+            <a:off x="914400" y="1828800"/>
+            <a:ext cx="10362895" cy="1371600"/>
           </a:xfrm>
           <a:prstGeom prst="rect">
             <a:avLst/>
@@ -4180,14 +4533,18 @@
           <a:lstStyle/>
           <a:p>
             <a:pPr algn="l">
-              <a:defRPr sz="1600" b="1">
-                <a:solidFill>
-                  <a:srgbClr val="0096D6"/>
+              <a:defRPr sz="4400" b="1">
+                <a:solidFill>
+                  <a:srgbClr val="FFFFFF"/>
                 </a:solidFill>
               </a:defRPr>
             </a:pPr>
             <a:r>
-              <a:t>SESSION 2</a:t>
+              <a:t>Prompting, Structured Output</a:t>
+            </a:r>
+            <a:br/>
+            <a:r>
+              <a:t>&amp; Multimodal APIs</a:t>
             </a:r>
           </a:p>
         </p:txBody>
@@ -4200,8 +4557,8 @@
         </p:nvSpPr>
         <p:spPr>
           <a:xfrm>
-            <a:off x="914400" y="1371600"/>
-            <a:ext cx="10058400" cy="1371600"/>
+            <a:off x="914400" y="3291840"/>
+            <a:ext cx="10362895" cy="914400"/>
           </a:xfrm>
           <a:prstGeom prst="rect">
             <a:avLst/>
@@ -4214,15 +4571,15 @@
           </a:bodyPr>
           <a:lstStyle/>
           <a:p>
-            <a:pPr>
-              <a:defRPr sz="4000" b="1">
-                <a:solidFill>
-                  <a:srgbClr val="FFFFFF"/>
+            <a:pPr algn="l">
+              <a:defRPr sz="2200">
+                <a:solidFill>
+                  <a:srgbClr val="0096D6"/>
                 </a:solidFill>
               </a:defRPr>
             </a:pPr>
             <a:r>
-              <a:t>Prompting, Structured Output &amp; Multimodal</a:t>
+              <a:t>System prompts, JSON schemas, vision, audio, and image generation</a:t>
             </a:r>
           </a:p>
         </p:txBody>
@@ -4235,8 +4592,8 @@
         </p:nvSpPr>
         <p:spPr>
           <a:xfrm>
-            <a:off x="914400" y="2743200"/>
-            <a:ext cx="10058400" cy="457200"/>
+            <a:off x="914400" y="4572000"/>
+            <a:ext cx="10362895" cy="548640"/>
           </a:xfrm>
           <a:prstGeom prst="rect">
             <a:avLst/>
@@ -4249,98 +4606,15 @@
           </a:bodyPr>
           <a:lstStyle/>
           <a:p>
-            <a:pPr>
-              <a:defRPr sz="1800">
-                <a:solidFill>
-                  <a:srgbClr val="88AACC"/>
+            <a:pPr algn="l">
+              <a:defRPr sz="1400">
+                <a:solidFill>
+                  <a:srgbClr val="8899BB"/>
                 </a:solidFill>
               </a:defRPr>
             </a:pPr>
             <a:r>
-              <a:t>Cut the Crap — AI Engineer Edition</a:t>
-            </a:r>
-          </a:p>
-        </p:txBody>
-      </p:sp>
-      <p:sp>
-        <p:nvSpPr>
-          <p:cNvPr id="5" name="TextBox 4"/>
-          <p:cNvSpPr txBox="1"/>
-          <p:nvPr/>
-        </p:nvSpPr>
-        <p:spPr>
-          <a:xfrm>
-            <a:off x="914400" y="3657600"/>
-            <a:ext cx="10058400" cy="2743200"/>
-          </a:xfrm>
-          <a:prstGeom prst="rect">
-            <a:avLst/>
-          </a:prstGeom>
-          <a:noFill/>
-        </p:spPr>
-        <p:txBody>
-          <a:bodyPr wrap="square">
-            <a:spAutoFit/>
-          </a:bodyPr>
-          <a:lstStyle/>
-          <a:p>
-            <a:pPr>
-              <a:spcAft>
-                <a:spcPts val="600"/>
-              </a:spcAft>
-              <a:defRPr sz="1600">
-                <a:solidFill>
-                  <a:srgbClr val="CCDDEE"/>
-                </a:solidFill>
-              </a:defRPr>
-            </a:pPr>
-            <a:r>
-              <a:t>▸ Prompt engineering that works in production</a:t>
-            </a:r>
-          </a:p>
-          <a:p>
-            <a:pPr>
-              <a:spcAft>
-                <a:spcPts val="600"/>
-              </a:spcAft>
-              <a:defRPr sz="1600">
-                <a:solidFill>
-                  <a:srgbClr val="CCDDEE"/>
-                </a:solidFill>
-              </a:defRPr>
-            </a:pPr>
-            <a:r>
-              <a:t>▸ Getting reliable JSON from LLMs (Pydantic everywhere)</a:t>
-            </a:r>
-          </a:p>
-          <a:p>
-            <a:pPr>
-              <a:spcAft>
-                <a:spcPts val="600"/>
-              </a:spcAft>
-              <a:defRPr sz="1600">
-                <a:solidFill>
-                  <a:srgbClr val="CCDDEE"/>
-                </a:solidFill>
-              </a:defRPr>
-            </a:pPr>
-            <a:r>
-              <a:t>▸ Multimodal: vision, audio, image generation</a:t>
-            </a:r>
-          </a:p>
-          <a:p>
-            <a:pPr>
-              <a:spcAft>
-                <a:spcPts val="600"/>
-              </a:spcAft>
-              <a:defRPr sz="1600">
-                <a:solidFill>
-                  <a:srgbClr val="CCDDEE"/>
-                </a:solidFill>
-              </a:defRPr>
-            </a:pPr>
-            <a:r>
-              <a:t>▸ Hands-on: build a multimodal analysis app</a:t>
+              <a:t>Session 2 of 8  •  Cut the Crap — AI Engineer Edition  •  February 2026</a:t>
             </a:r>
           </a:p>
         </p:txBody>
@@ -4356,14 +4630,6 @@
 <file path=ppt/slides/slide10.xml><?xml version="1.0" encoding="utf-8"?>
 <p:sld xmlns:a="http://schemas.openxmlformats.org/drawingml/2006/main" xmlns:p="http://schemas.openxmlformats.org/presentationml/2006/main" xmlns:r="http://schemas.openxmlformats.org/officeDocument/2006/relationships">
   <p:cSld>
-    <p:bg>
-      <p:bgPr>
-        <a:solidFill>
-          <a:srgbClr val="FFFFFF"/>
-        </a:solidFill>
-        <a:effectLst/>
-      </p:bgPr>
-    </p:bg>
     <p:spTree>
       <p:nvGrpSpPr>
         <p:cNvPr id="1" name=""/>
@@ -4380,7 +4646,7 @@
         <p:spPr>
           <a:xfrm>
             <a:off x="0" y="0"/>
-            <a:ext cx="12191695" cy="54864"/>
+            <a:ext cx="12191695" cy="73152"/>
           </a:xfrm>
           <a:prstGeom prst="rect">
             <a:avLst/>
@@ -4423,7 +4689,7 @@
         <p:spPr>
           <a:xfrm>
             <a:off x="731520" y="274320"/>
-            <a:ext cx="10515600" cy="731520"/>
+            <a:ext cx="10728655" cy="731520"/>
           </a:xfrm>
           <a:prstGeom prst="rect">
             <a:avLst/>
@@ -4431,7 +4697,7 @@
           <a:noFill/>
         </p:spPr>
         <p:txBody>
-          <a:bodyPr wrap="square">
+          <a:bodyPr wrap="none">
             <a:spAutoFit/>
           </a:bodyPr>
           <a:lstStyle/>
@@ -4444,154 +4710,32 @@
               </a:defRPr>
             </a:pPr>
             <a:r>
-              <a:t>Audio &amp; Image Generation</a:t>
-            </a:r>
-          </a:p>
-        </p:txBody>
-      </p:sp>
-      <p:sp>
-        <p:nvSpPr>
-          <p:cNvPr id="4" name="TextBox 3"/>
-          <p:cNvSpPr txBox="1"/>
-          <p:nvPr/>
-        </p:nvSpPr>
-        <p:spPr>
-          <a:xfrm>
-            <a:off x="731520" y="1188720"/>
-            <a:ext cx="10515600" cy="5029200"/>
-          </a:xfrm>
-          <a:prstGeom prst="rect">
-            <a:avLst/>
-          </a:prstGeom>
-          <a:noFill/>
-        </p:spPr>
-        <p:txBody>
-          <a:bodyPr wrap="square">
-            <a:spAutoFit/>
-          </a:bodyPr>
-          <a:lstStyle/>
-          <a:p>
-            <a:pPr>
-              <a:spcAft>
-                <a:spcPts val="800"/>
-              </a:spcAft>
-              <a:defRPr sz="1800">
-                <a:solidFill>
-                  <a:srgbClr val="333333"/>
-                </a:solidFill>
-              </a:defRPr>
-            </a:pPr>
-            <a:r>
-              <a:t>Speech-to-text: Whisper — handles accents, noise, multiple languages</a:t>
-            </a:r>
-          </a:p>
-          <a:p>
-            <a:pPr>
-              <a:spcAft>
-                <a:spcPts val="800"/>
-              </a:spcAft>
-              <a:defRPr sz="1800">
-                <a:solidFill>
-                  <a:srgbClr val="333333"/>
-                </a:solidFill>
-              </a:defRPr>
-            </a:pPr>
-            <a:r>
-              <a:t>Text-to-speech: OpenAI TTS (6 voices), Gemini native audio</a:t>
-            </a:r>
-          </a:p>
-          <a:p>
-            <a:pPr>
-              <a:spcAft>
-                <a:spcPts val="800"/>
-              </a:spcAft>
-              <a:defRPr sz="1800">
-                <a:solidFill>
-                  <a:srgbClr val="333333"/>
-                </a:solidFill>
-              </a:defRPr>
-            </a:pPr>
-            <a:r>
-              <a:t>Gemini 3 Pro processes audio natively — transcribe + summarize in one call</a:t>
-            </a:r>
-          </a:p>
-          <a:p>
-            <a:pPr>
-              <a:spcAft>
-                <a:spcPts val="800"/>
-              </a:spcAft>
-              <a:defRPr sz="1800">
-                <a:solidFill>
-                  <a:srgbClr val="333333"/>
-                </a:solidFill>
-              </a:defRPr>
-            </a:pPr>
-            <a:r>
-              <a:t>Image gen: DALL-E 3 (OpenAI), Imagen 3 (Google) — Anthropic does not generate images</a:t>
-            </a:r>
-          </a:p>
-          <a:p>
-            <a:pPr>
-              <a:spcAft>
-                <a:spcPts val="800"/>
-              </a:spcAft>
-              <a:defRPr sz="1800">
-                <a:solidFill>
-                  <a:srgbClr val="333333"/>
-                </a:solidFill>
-              </a:defRPr>
-            </a:pPr>
-            <a:r>
-              <a:t>DALL-E 3 rewrites your prompt (check revised_prompt), Imagen 3 excels at photorealism</a:t>
-            </a:r>
-          </a:p>
-        </p:txBody>
-      </p:sp>
-    </p:spTree>
-  </p:cSld>
-  <p:clrMapOvr>
-    <a:masterClrMapping/>
-  </p:clrMapOvr>
-</p:sld>
-</file>
-
-<file path=ppt/slides/slide11.xml><?xml version="1.0" encoding="utf-8"?>
-<p:sld xmlns:a="http://schemas.openxmlformats.org/drawingml/2006/main" xmlns:p="http://schemas.openxmlformats.org/presentationml/2006/main" xmlns:r="http://schemas.openxmlformats.org/officeDocument/2006/relationships">
-  <p:cSld>
-    <p:bg>
-      <p:bgPr>
-        <a:solidFill>
-          <a:srgbClr val="FFFFFF"/>
-        </a:solidFill>
-        <a:effectLst/>
-      </p:bgPr>
-    </p:bg>
-    <p:spTree>
-      <p:nvGrpSpPr>
-        <p:cNvPr id="1" name=""/>
-        <p:cNvGrpSpPr/>
-        <p:nvPr/>
-      </p:nvGrpSpPr>
-      <p:grpSpPr/>
-      <p:sp>
-        <p:nvSpPr>
-          <p:cNvPr id="2" name="Rectangle 1"/>
+              <a:t>Vision — Anthropic (Sonnet 4.6)</a:t>
+            </a:r>
+          </a:p>
+        </p:txBody>
+      </p:sp>
+      <p:sp>
+        <p:nvSpPr>
+          <p:cNvPr id="4" name="Rounded Rectangle 3"/>
           <p:cNvSpPr/>
           <p:nvPr/>
         </p:nvSpPr>
         <p:spPr>
           <a:xfrm>
-            <a:off x="0" y="0"/>
-            <a:ext cx="12191695" cy="54864"/>
-          </a:xfrm>
-          <a:prstGeom prst="rect">
+            <a:off x="731520" y="1188720"/>
+            <a:ext cx="10728655" cy="5212080"/>
+          </a:xfrm>
+          <a:prstGeom prst="roundRect">
             <a:avLst/>
           </a:prstGeom>
           <a:solidFill>
-            <a:srgbClr val="0096D6"/>
+            <a:srgbClr val="F0F0F0"/>
           </a:solidFill>
-          <a:ln>
-            <a:noFill/>
+          <a:ln w="12700">
+            <a:solidFill>
+              <a:srgbClr val="DDDDDD"/>
+            </a:solidFill>
           </a:ln>
         </p:spPr>
         <p:style>
@@ -4618,14 +4762,14 @@
       </p:sp>
       <p:sp>
         <p:nvSpPr>
-          <p:cNvPr id="3" name="TextBox 2"/>
+          <p:cNvPr id="5" name="TextBox 4"/>
           <p:cNvSpPr txBox="1"/>
           <p:nvPr/>
         </p:nvSpPr>
         <p:spPr>
           <a:xfrm>
-            <a:off x="731520" y="274320"/>
-            <a:ext cx="10515600" cy="731520"/>
+            <a:off x="822960" y="1234440"/>
+            <a:ext cx="1828800" cy="320040"/>
           </a:xfrm>
           <a:prstGeom prst="rect">
             <a:avLst/>
@@ -4633,34 +4777,34 @@
           <a:noFill/>
         </p:spPr>
         <p:txBody>
-          <a:bodyPr wrap="square">
+          <a:bodyPr wrap="none">
             <a:spAutoFit/>
           </a:bodyPr>
           <a:lstStyle/>
           <a:p>
             <a:pPr>
-              <a:defRPr sz="2800" b="1">
-                <a:solidFill>
-                  <a:srgbClr val="1B2A4A"/>
+              <a:defRPr sz="1100" b="1">
+                <a:solidFill>
+                  <a:srgbClr val="666666"/>
                 </a:solidFill>
               </a:defRPr>
             </a:pPr>
             <a:r>
-              <a:t>Hands-On: Multimodal Analysis App</a:t>
-            </a:r>
-          </a:p>
-        </p:txBody>
-      </p:sp>
-      <p:sp>
-        <p:nvSpPr>
-          <p:cNvPr id="4" name="TextBox 3"/>
+              <a:t>python</a:t>
+            </a:r>
+          </a:p>
+        </p:txBody>
+      </p:sp>
+      <p:sp>
+        <p:nvSpPr>
+          <p:cNvPr id="6" name="TextBox 5"/>
           <p:cNvSpPr txBox="1"/>
           <p:nvPr/>
         </p:nvSpPr>
         <p:spPr>
           <a:xfrm>
-            <a:off x="731520" y="1188720"/>
-            <a:ext cx="10515600" cy="5029200"/>
+            <a:off x="914400" y="1554480"/>
+            <a:ext cx="10362895" cy="4754880"/>
           </a:xfrm>
           <a:prstGeom prst="rect">
             <a:avLst/>
@@ -4673,78 +4817,72 @@
           </a:bodyPr>
           <a:lstStyle/>
           <a:p>
-            <a:pPr>
-              <a:spcAft>
-                <a:spcPts val="800"/>
-              </a:spcAft>
-              <a:defRPr sz="1800">
+            <a:pPr algn="l">
+              <a:defRPr sz="1300">
                 <a:solidFill>
                   <a:srgbClr val="333333"/>
                 </a:solidFill>
+                <a:latin typeface="Consolas"/>
               </a:defRPr>
             </a:pPr>
             <a:r>
-              <a:t>Send the same image to GPT-5.2, Claude Sonnet 4.6, and Gemini 3 Pro</a:t>
-            </a:r>
-          </a:p>
-          <a:p>
-            <a:pPr>
-              <a:spcAft>
-                <a:spcPts val="800"/>
-              </a:spcAft>
-              <a:defRPr sz="1800">
-                <a:solidFill>
-                  <a:srgbClr val="333333"/>
-                </a:solidFill>
-              </a:defRPr>
-            </a:pPr>
-            <a:r>
-              <a:t>Compare three descriptions side by side</a:t>
-            </a:r>
-          </a:p>
-          <a:p>
-            <a:pPr>
-              <a:spcAft>
-                <a:spcPts val="800"/>
-              </a:spcAft>
-              <a:defRPr sz="1800">
-                <a:solidFill>
-                  <a:srgbClr val="333333"/>
-                </a:solidFill>
-              </a:defRPr>
-            </a:pPr>
-            <a:r>
-              <a:t>Extract structured data (objects, colors, mood) using Pydantic schemas</a:t>
-            </a:r>
-          </a:p>
-          <a:p>
-            <a:pPr>
-              <a:spcAft>
-                <a:spcPts val="800"/>
-              </a:spcAft>
-              <a:defRPr sz="1800">
-                <a:solidFill>
-                  <a:srgbClr val="333333"/>
-                </a:solidFill>
-              </a:defRPr>
-            </a:pPr>
-            <a:r>
-              <a:t>Optionally generate a TTS narration of the best description</a:t>
-            </a:r>
-          </a:p>
-          <a:p>
-            <a:pPr>
-              <a:spcAft>
-                <a:spcPts val="800"/>
-              </a:spcAft>
-              <a:defRPr sz="1800">
-                <a:solidFill>
-                  <a:srgbClr val="333333"/>
-                </a:solidFill>
-              </a:defRPr>
-            </a:pPr>
-            <a:r>
-              <a:t>📝 Time: 25 minutes — starter code: session-2/code/multimodal_app.py</a:t>
+              <a:t>response = client.messages.create(</a:t>
+            </a:r>
+            <a:br/>
+            <a:r>
+              <a:t>    model="claude-sonnet-4-6-20250217",</a:t>
+            </a:r>
+            <a:br/>
+            <a:r>
+              <a:t>    max_tokens=1024,</a:t>
+            </a:r>
+            <a:br/>
+            <a:r>
+              <a:t>    messages=[{</a:t>
+            </a:r>
+            <a:br/>
+            <a:r>
+              <a:t>        "role": "user",</a:t>
+            </a:r>
+            <a:br/>
+            <a:r>
+              <a:t>        "content": [</a:t>
+            </a:r>
+            <a:br/>
+            <a:r>
+              <a:t>            {"type": "image", "source": {</a:t>
+            </a:r>
+            <a:br/>
+            <a:r>
+              <a:t>                "type": "base64",</a:t>
+            </a:r>
+            <a:br/>
+            <a:r>
+              <a:t>                "media_type": "image/jpeg",</a:t>
+            </a:r>
+            <a:br/>
+            <a:r>
+              <a:t>                "data": b64_image,</a:t>
+            </a:r>
+            <a:br/>
+            <a:r>
+              <a:t>            }},</a:t>
+            </a:r>
+            <a:br/>
+            <a:r>
+              <a:t>            {"type": "text", "text": "Describe this image"},</a:t>
+            </a:r>
+            <a:br/>
+            <a:r>
+              <a:t>        ],</a:t>
+            </a:r>
+            <a:br/>
+            <a:r>
+              <a:t>    }],</a:t>
+            </a:r>
+            <a:br/>
+            <a:r>
+              <a:t>)</a:t>
             </a:r>
           </a:p>
         </p:txBody>
@@ -4757,17 +4895,9 @@
 </p:sld>
 </file>
 
-<file path=ppt/slides/slide12.xml><?xml version="1.0" encoding="utf-8"?>
+<file path=ppt/slides/slide11.xml><?xml version="1.0" encoding="utf-8"?>
 <p:sld xmlns:a="http://schemas.openxmlformats.org/drawingml/2006/main" xmlns:p="http://schemas.openxmlformats.org/presentationml/2006/main" xmlns:r="http://schemas.openxmlformats.org/officeDocument/2006/relationships">
   <p:cSld>
-    <p:bg>
-      <p:bgPr>
-        <a:solidFill>
-          <a:srgbClr val="FFFFFF"/>
-        </a:solidFill>
-        <a:effectLst/>
-      </p:bgPr>
-    </p:bg>
     <p:spTree>
       <p:nvGrpSpPr>
         <p:cNvPr id="1" name=""/>
@@ -4784,7 +4914,7 @@
         <p:spPr>
           <a:xfrm>
             <a:off x="0" y="0"/>
-            <a:ext cx="12191695" cy="54864"/>
+            <a:ext cx="12191695" cy="73152"/>
           </a:xfrm>
           <a:prstGeom prst="rect">
             <a:avLst/>
@@ -4827,7 +4957,7 @@
         <p:spPr>
           <a:xfrm>
             <a:off x="731520" y="274320"/>
-            <a:ext cx="10515600" cy="731520"/>
+            <a:ext cx="10728655" cy="822960"/>
           </a:xfrm>
           <a:prstGeom prst="rect">
             <a:avLst/>
@@ -4840,15 +4970,15 @@
           </a:bodyPr>
           <a:lstStyle/>
           <a:p>
-            <a:pPr>
-              <a:defRPr sz="2800" b="1">
+            <a:pPr algn="l">
+              <a:defRPr sz="3200" b="1">
                 <a:solidFill>
                   <a:srgbClr val="1B2A4A"/>
                 </a:solidFill>
               </a:defRPr>
             </a:pPr>
             <a:r>
-              <a:t>Session 2 Recap</a:t>
+              <a:t>Audio APIs</a:t>
             </a:r>
           </a:p>
         </p:txBody>
@@ -4861,8 +4991,8 @@
         </p:nvSpPr>
         <p:spPr>
           <a:xfrm>
-            <a:off x="731520" y="1188720"/>
-            <a:ext cx="10515600" cy="5029200"/>
+            <a:off x="914400" y="1280160"/>
+            <a:ext cx="10362895" cy="5029200"/>
           </a:xfrm>
           <a:prstGeom prst="rect">
             <a:avLst/>
@@ -4876,92 +5006,110 @@
           <a:lstStyle/>
           <a:p>
             <a:pPr>
+              <a:spcBef>
+                <a:spcPts val="400"/>
+              </a:spcBef>
               <a:spcAft>
                 <a:spcPts val="800"/>
               </a:spcAft>
-              <a:defRPr sz="1800">
+              <a:defRPr sz="2000">
                 <a:solidFill>
                   <a:srgbClr val="333333"/>
                 </a:solidFill>
               </a:defRPr>
             </a:pPr>
             <a:r>
-              <a:t>✅ System prompts are your most powerful tool — be specific, use XML tags</a:t>
+              <a:t>Speech-to-Text: Whisper (transcribe audio → text)</a:t>
             </a:r>
           </a:p>
           <a:p>
             <a:pPr>
+              <a:spcBef>
+                <a:spcPts val="400"/>
+              </a:spcBef>
               <a:spcAft>
                 <a:spcPts val="800"/>
               </a:spcAft>
-              <a:defRPr sz="1800">
+              <a:defRPr sz="2000">
                 <a:solidFill>
                   <a:srgbClr val="333333"/>
                 </a:solidFill>
               </a:defRPr>
             </a:pPr>
             <a:r>
-              <a:t>✅ Few-shot &gt; zero-shot; chain-of-thought works for reasoning tasks</a:t>
+              <a:t>Text-to-Speech: tts-1, tts-1-hd (text → spoken audio)</a:t>
             </a:r>
           </a:p>
           <a:p>
             <a:pPr>
+              <a:spcBef>
+                <a:spcPts val="400"/>
+              </a:spcBef>
               <a:spcAft>
                 <a:spcPts val="800"/>
               </a:spcAft>
-              <a:defRPr sz="1800">
+              <a:defRPr sz="2000">
                 <a:solidFill>
                   <a:srgbClr val="333333"/>
                 </a:solidFill>
               </a:defRPr>
             </a:pPr>
             <a:r>
-              <a:t>✅ Structured output: Pydantic + provider features → guaranteed schemas</a:t>
+              <a:t>Realtime Audio: gpt-audio-1.5 (live voice conversations)</a:t>
             </a:r>
           </a:p>
           <a:p>
             <a:pPr>
+              <a:spcBef>
+                <a:spcPts val="400"/>
+              </a:spcBef>
               <a:spcAft>
                 <a:spcPts val="800"/>
               </a:spcAft>
-              <a:defRPr sz="1800">
+              <a:defRPr sz="2000">
                 <a:solidFill>
                   <a:srgbClr val="333333"/>
                 </a:solidFill>
               </a:defRPr>
             </a:pPr>
             <a:r>
-              <a:t>✅ Vision: all 3 providers; Gemini 3 Pro natively handles text+image+audio+video</a:t>
+              <a:t>Voices: alloy, echo, fable, onyx, nova, shimmer</a:t>
             </a:r>
           </a:p>
           <a:p>
             <a:pPr>
+              <a:spcBef>
+                <a:spcPts val="400"/>
+              </a:spcBef>
               <a:spcAft>
                 <a:spcPts val="800"/>
               </a:spcAft>
-              <a:defRPr sz="1800">
+              <a:defRPr sz="2000">
                 <a:solidFill>
                   <a:srgbClr val="333333"/>
                 </a:solidFill>
               </a:defRPr>
             </a:pPr>
             <a:r>
-              <a:t>✅ Audio: Whisper (STT), TTS, Gemini native; Image gen: DALL-E 3, Imagen 3</a:t>
+              <a:t>Use case: voice assistants, transcription, accessibility</a:t>
             </a:r>
           </a:p>
           <a:p>
             <a:pPr>
+              <a:spcBef>
+                <a:spcPts val="400"/>
+              </a:spcBef>
               <a:spcAft>
                 <a:spcPts val="800"/>
               </a:spcAft>
-              <a:defRPr sz="1800">
+              <a:defRPr sz="2000">
                 <a:solidFill>
                   <a:srgbClr val="333333"/>
                 </a:solidFill>
               </a:defRPr>
             </a:pPr>
             <a:r>
-              <a:t>Next → Session 3: Tool use, function calling, custom assistants</a:t>
+              <a:t>Cost: Whisper ~$0.006/min, TTS ~$0.015/1K chars</a:t>
             </a:r>
           </a:p>
         </p:txBody>
@@ -4974,17 +5122,9 @@
 </p:sld>
 </file>
 
-<file path=ppt/slides/slide2.xml><?xml version="1.0" encoding="utf-8"?>
+<file path=ppt/slides/slide12.xml><?xml version="1.0" encoding="utf-8"?>
 <p:sld xmlns:a="http://schemas.openxmlformats.org/drawingml/2006/main" xmlns:p="http://schemas.openxmlformats.org/presentationml/2006/main" xmlns:r="http://schemas.openxmlformats.org/officeDocument/2006/relationships">
   <p:cSld>
-    <p:bg>
-      <p:bgPr>
-        <a:solidFill>
-          <a:srgbClr val="FFFFFF"/>
-        </a:solidFill>
-        <a:effectLst/>
-      </p:bgPr>
-    </p:bg>
     <p:spTree>
       <p:nvGrpSpPr>
         <p:cNvPr id="1" name=""/>
@@ -5001,7 +5141,7 @@
         <p:spPr>
           <a:xfrm>
             <a:off x="0" y="0"/>
-            <a:ext cx="12191695" cy="54864"/>
+            <a:ext cx="12191695" cy="73152"/>
           </a:xfrm>
           <a:prstGeom prst="rect">
             <a:avLst/>
@@ -5044,7 +5184,7 @@
         <p:spPr>
           <a:xfrm>
             <a:off x="731520" y="274320"/>
-            <a:ext cx="10515600" cy="731520"/>
+            <a:ext cx="10728655" cy="822960"/>
           </a:xfrm>
           <a:prstGeom prst="rect">
             <a:avLst/>
@@ -5057,35 +5197,184 @@
           </a:bodyPr>
           <a:lstStyle/>
           <a:p>
+            <a:pPr algn="l">
+              <a:defRPr sz="3200" b="1">
+                <a:solidFill>
+                  <a:srgbClr val="1B2A4A"/>
+                </a:solidFill>
+              </a:defRPr>
+            </a:pPr>
+            <a:r>
+              <a:t>Image Generation — GPT Image 1.5</a:t>
+            </a:r>
+          </a:p>
+        </p:txBody>
+      </p:sp>
+      <p:sp>
+        <p:nvSpPr>
+          <p:cNvPr id="4" name="TextBox 3"/>
+          <p:cNvSpPr txBox="1"/>
+          <p:nvPr/>
+        </p:nvSpPr>
+        <p:spPr>
+          <a:xfrm>
+            <a:off x="914400" y="1280160"/>
+            <a:ext cx="10362895" cy="5029200"/>
+          </a:xfrm>
+          <a:prstGeom prst="rect">
+            <a:avLst/>
+          </a:prstGeom>
+          <a:noFill/>
+        </p:spPr>
+        <p:txBody>
+          <a:bodyPr wrap="square">
+            <a:spAutoFit/>
+          </a:bodyPr>
+          <a:lstStyle/>
+          <a:p>
             <a:pPr>
-              <a:defRPr sz="2800" b="1">
-                <a:solidFill>
-                  <a:srgbClr val="1B2A4A"/>
+              <a:spcBef>
+                <a:spcPts val="400"/>
+              </a:spcBef>
+              <a:spcAft>
+                <a:spcPts val="800"/>
+              </a:spcAft>
+              <a:defRPr sz="2000">
+                <a:solidFill>
+                  <a:srgbClr val="333333"/>
                 </a:solidFill>
               </a:defRPr>
             </a:pPr>
             <a:r>
-              <a:t>System Prompts — Your Most Powerful Tool</a:t>
-            </a:r>
-          </a:p>
-        </p:txBody>
-      </p:sp>
-      <p:sp>
-        <p:nvSpPr>
-          <p:cNvPr id="4" name="Rounded Rectangle 3"/>
+              <a:t>OpenAI's image generation via API</a:t>
+            </a:r>
+          </a:p>
+          <a:p>
+            <a:pPr>
+              <a:spcBef>
+                <a:spcPts val="400"/>
+              </a:spcBef>
+              <a:spcAft>
+                <a:spcPts val="800"/>
+              </a:spcAft>
+              <a:defRPr sz="2000">
+                <a:solidFill>
+                  <a:srgbClr val="333333"/>
+                </a:solidFill>
+              </a:defRPr>
+            </a:pPr>
+            <a:r>
+              <a:t>Models: gpt-image-1, gpt-image-1.5 (latest, best quality)</a:t>
+            </a:r>
+          </a:p>
+          <a:p>
+            <a:pPr>
+              <a:spcBef>
+                <a:spcPts val="400"/>
+              </a:spcBef>
+              <a:spcAft>
+                <a:spcPts val="800"/>
+              </a:spcAft>
+              <a:defRPr sz="2000">
+                <a:solidFill>
+                  <a:srgbClr val="333333"/>
+                </a:solidFill>
+              </a:defRPr>
+            </a:pPr>
+            <a:r>
+              <a:t>Sizes: 1024×1024, 1024×1792, 1792×1024</a:t>
+            </a:r>
+          </a:p>
+          <a:p>
+            <a:pPr>
+              <a:spcBef>
+                <a:spcPts val="400"/>
+              </a:spcBef>
+              <a:spcAft>
+                <a:spcPts val="800"/>
+              </a:spcAft>
+              <a:defRPr sz="2000">
+                <a:solidFill>
+                  <a:srgbClr val="333333"/>
+                </a:solidFill>
+              </a:defRPr>
+            </a:pPr>
+            <a:r>
+              <a:t>Quality: standard or high (HD)</a:t>
+            </a:r>
+          </a:p>
+          <a:p>
+            <a:pPr>
+              <a:spcBef>
+                <a:spcPts val="400"/>
+              </a:spcBef>
+              <a:spcAft>
+                <a:spcPts val="800"/>
+              </a:spcAft>
+              <a:defRPr sz="2000">
+                <a:solidFill>
+                  <a:srgbClr val="333333"/>
+                </a:solidFill>
+              </a:defRPr>
+            </a:pPr>
+            <a:r>
+              <a:t>Also: image editing and variations</a:t>
+            </a:r>
+          </a:p>
+          <a:p>
+            <a:pPr>
+              <a:spcBef>
+                <a:spcPts val="400"/>
+              </a:spcBef>
+              <a:spcAft>
+                <a:spcPts val="800"/>
+              </a:spcAft>
+              <a:defRPr sz="2000">
+                <a:solidFill>
+                  <a:srgbClr val="333333"/>
+                </a:solidFill>
+              </a:defRPr>
+            </a:pPr>
+            <a:r>
+              <a:t>Alternative: Sora 2 for video generation</a:t>
+            </a:r>
+          </a:p>
+        </p:txBody>
+      </p:sp>
+    </p:spTree>
+  </p:cSld>
+  <p:clrMapOvr>
+    <a:masterClrMapping/>
+  </p:clrMapOvr>
+</p:sld>
+</file>
+
+<file path=ppt/slides/slide13.xml><?xml version="1.0" encoding="utf-8"?>
+<p:sld xmlns:a="http://schemas.openxmlformats.org/drawingml/2006/main" xmlns:p="http://schemas.openxmlformats.org/presentationml/2006/main" xmlns:r="http://schemas.openxmlformats.org/officeDocument/2006/relationships">
+  <p:cSld>
+    <p:spTree>
+      <p:nvGrpSpPr>
+        <p:cNvPr id="1" name=""/>
+        <p:cNvGrpSpPr/>
+        <p:nvPr/>
+      </p:nvGrpSpPr>
+      <p:grpSpPr/>
+      <p:sp>
+        <p:nvSpPr>
+          <p:cNvPr id="2" name="Rectangle 1"/>
           <p:cNvSpPr/>
           <p:nvPr/>
         </p:nvSpPr>
         <p:spPr>
           <a:xfrm>
-            <a:off x="548640" y="1188720"/>
-            <a:ext cx="10972800" cy="4754880"/>
-          </a:xfrm>
-          <a:prstGeom prst="roundRect">
+            <a:off x="0" y="0"/>
+            <a:ext cx="12191695" cy="73152"/>
+          </a:xfrm>
+          <a:prstGeom prst="rect">
             <a:avLst/>
           </a:prstGeom>
           <a:solidFill>
-            <a:srgbClr val="F0F0F0"/>
+            <a:srgbClr val="0096D6"/>
           </a:solidFill>
           <a:ln>
             <a:noFill/>
@@ -5115,14 +5404,14 @@
       </p:sp>
       <p:sp>
         <p:nvSpPr>
-          <p:cNvPr id="5" name="TextBox 4"/>
+          <p:cNvPr id="3" name="TextBox 2"/>
           <p:cNvSpPr txBox="1"/>
           <p:nvPr/>
         </p:nvSpPr>
         <p:spPr>
           <a:xfrm>
-            <a:off x="822960" y="1371600"/>
-            <a:ext cx="10424160" cy="4389120"/>
+            <a:off x="731520" y="274320"/>
+            <a:ext cx="10728655" cy="731520"/>
           </a:xfrm>
           <a:prstGeom prst="rect">
             <a:avLst/>
@@ -5130,140 +5419,45 @@
           <a:noFill/>
         </p:spPr>
         <p:txBody>
-          <a:bodyPr wrap="square">
+          <a:bodyPr wrap="none">
             <a:spAutoFit/>
           </a:bodyPr>
           <a:lstStyle/>
           <a:p>
             <a:pPr>
-              <a:defRPr sz="1200">
-                <a:solidFill>
-                  <a:srgbClr val="333333"/>
-                </a:solidFill>
-                <a:latin typeface="Consolas"/>
+              <a:defRPr sz="2800" b="1">
+                <a:solidFill>
+                  <a:srgbClr val="1B2A4A"/>
+                </a:solidFill>
               </a:defRPr>
             </a:pPr>
             <a:r>
-              <a:t># OpenAI — system prompt in messages array</a:t>
-            </a:r>
-            <a:br/>
-            <a:r>
-              <a:t>messages = [</a:t>
-            </a:r>
-            <a:br/>
-            <a:r>
-              <a:t>    {"role": "system", "content": "You are a senior Python dev. Code only. No explanations."},</a:t>
-            </a:r>
-            <a:br/>
-            <a:r>
-              <a:t>    {"role": "user", "content": "Parse this CSV and find duplicates"}</a:t>
-            </a:r>
-            <a:br/>
-            <a:r>
-              <a:t>]</a:t>
-            </a:r>
-            <a:br/>
-            <a:br/>
-            <a:r>
-              <a:t># Anthropic — system as separate parameter</a:t>
-            </a:r>
-            <a:br/>
-            <a:r>
-              <a:t>response = client.messages.create(</a:t>
-            </a:r>
-            <a:br/>
-            <a:r>
-              <a:t>    model="claude-sonnet-4-6-20250217",</a:t>
-            </a:r>
-            <a:br/>
-            <a:r>
-              <a:t>    system="You are a senior Python dev. Code only. No explanations.",</a:t>
-            </a:r>
-            <a:br/>
-            <a:r>
-              <a:t>    max_tokens=2048,</a:t>
-            </a:r>
-            <a:br/>
-            <a:r>
-              <a:t>    messages=[{"role": "user", "content": "Parse CSV, find duplicates"}]</a:t>
-            </a:r>
-            <a:br/>
-            <a:r>
-              <a:t>)</a:t>
-            </a:r>
-            <a:br/>
-            <a:br/>
-            <a:r>
-              <a:t># Google — system_instruction parameter</a:t>
-            </a:r>
-            <a:br/>
-            <a:r>
-              <a:t>response = client.models.generate_content(</a:t>
-            </a:r>
-            <a:br/>
-            <a:r>
-              <a:t>    model="gemini-3-pro",</a:t>
-            </a:r>
-            <a:br/>
-            <a:r>
-              <a:t>    config={"system_instruction": "You are a senior Python dev. Code only."},</a:t>
-            </a:r>
-            <a:br/>
-            <a:r>
-              <a:t>    contents="Parse this CSV and find duplicates"</a:t>
-            </a:r>
-            <a:br/>
-            <a:r>
-              <a:t>)</a:t>
-            </a:r>
-          </a:p>
-        </p:txBody>
-      </p:sp>
-    </p:spTree>
-  </p:cSld>
-  <p:clrMapOvr>
-    <a:masterClrMapping/>
-  </p:clrMapOvr>
-</p:sld>
-</file>
-
-<file path=ppt/slides/slide3.xml><?xml version="1.0" encoding="utf-8"?>
-<p:sld xmlns:a="http://schemas.openxmlformats.org/drawingml/2006/main" xmlns:p="http://schemas.openxmlformats.org/presentationml/2006/main" xmlns:r="http://schemas.openxmlformats.org/officeDocument/2006/relationships">
-  <p:cSld>
-    <p:bg>
-      <p:bgPr>
-        <a:solidFill>
-          <a:srgbClr val="FFFFFF"/>
-        </a:solidFill>
-        <a:effectLst/>
-      </p:bgPr>
-    </p:bg>
-    <p:spTree>
-      <p:nvGrpSpPr>
-        <p:cNvPr id="1" name=""/>
-        <p:cNvGrpSpPr/>
-        <p:nvPr/>
-      </p:nvGrpSpPr>
-      <p:grpSpPr/>
-      <p:sp>
-        <p:nvSpPr>
-          <p:cNvPr id="2" name="Rectangle 1"/>
+              <a:t>Image Generation Code</a:t>
+            </a:r>
+          </a:p>
+        </p:txBody>
+      </p:sp>
+      <p:sp>
+        <p:nvSpPr>
+          <p:cNvPr id="4" name="Rounded Rectangle 3"/>
           <p:cNvSpPr/>
           <p:nvPr/>
         </p:nvSpPr>
         <p:spPr>
           <a:xfrm>
-            <a:off x="0" y="0"/>
-            <a:ext cx="12191695" cy="54864"/>
-          </a:xfrm>
-          <a:prstGeom prst="rect">
+            <a:off x="731520" y="1188720"/>
+            <a:ext cx="10728655" cy="5212080"/>
+          </a:xfrm>
+          <a:prstGeom prst="roundRect">
             <a:avLst/>
           </a:prstGeom>
           <a:solidFill>
-            <a:srgbClr val="0096D6"/>
+            <a:srgbClr val="F0F0F0"/>
           </a:solidFill>
-          <a:ln>
-            <a:noFill/>
+          <a:ln w="12700">
+            <a:solidFill>
+              <a:srgbClr val="DDDDDD"/>
+            </a:solidFill>
           </a:ln>
         </p:spPr>
         <p:style>
@@ -5290,14 +5484,14 @@
       </p:sp>
       <p:sp>
         <p:nvSpPr>
-          <p:cNvPr id="3" name="TextBox 2"/>
+          <p:cNvPr id="5" name="TextBox 4"/>
           <p:cNvSpPr txBox="1"/>
           <p:nvPr/>
         </p:nvSpPr>
         <p:spPr>
           <a:xfrm>
-            <a:off x="731520" y="274320"/>
-            <a:ext cx="10515600" cy="731520"/>
+            <a:off x="822960" y="1234440"/>
+            <a:ext cx="1828800" cy="320040"/>
           </a:xfrm>
           <a:prstGeom prst="rect">
             <a:avLst/>
@@ -5305,34 +5499,34 @@
           <a:noFill/>
         </p:spPr>
         <p:txBody>
-          <a:bodyPr wrap="square">
+          <a:bodyPr wrap="none">
             <a:spAutoFit/>
           </a:bodyPr>
           <a:lstStyle/>
           <a:p>
             <a:pPr>
-              <a:defRPr sz="2800" b="1">
-                <a:solidFill>
-                  <a:srgbClr val="1B2A4A"/>
+              <a:defRPr sz="1100" b="1">
+                <a:solidFill>
+                  <a:srgbClr val="666666"/>
                 </a:solidFill>
               </a:defRPr>
             </a:pPr>
             <a:r>
-              <a:t>5 Prompt Techniques That Cover 90% of Needs</a:t>
-            </a:r>
-          </a:p>
-        </p:txBody>
-      </p:sp>
-      <p:sp>
-        <p:nvSpPr>
-          <p:cNvPr id="4" name="TextBox 3"/>
+              <a:t>python</a:t>
+            </a:r>
+          </a:p>
+        </p:txBody>
+      </p:sp>
+      <p:sp>
+        <p:nvSpPr>
+          <p:cNvPr id="6" name="TextBox 5"/>
           <p:cNvSpPr txBox="1"/>
           <p:nvPr/>
         </p:nvSpPr>
         <p:spPr>
           <a:xfrm>
-            <a:off x="731520" y="1188720"/>
-            <a:ext cx="10515600" cy="5029200"/>
+            <a:off x="914400" y="1554480"/>
+            <a:ext cx="10362895" cy="4754880"/>
           </a:xfrm>
           <a:prstGeom prst="rect">
             <a:avLst/>
@@ -5345,78 +5539,73 @@
           </a:bodyPr>
           <a:lstStyle/>
           <a:p>
-            <a:pPr>
-              <a:spcAft>
-                <a:spcPts val="800"/>
-              </a:spcAft>
-              <a:defRPr sz="1800">
+            <a:pPr algn="l">
+              <a:defRPr sz="1300">
                 <a:solidFill>
                   <a:srgbClr val="333333"/>
                 </a:solidFill>
+                <a:latin typeface="Consolas"/>
               </a:defRPr>
             </a:pPr>
             <a:r>
-              <a:t>1. BE SPECIFIC — ❌ "Summarize this" → ✅ "3 bullets, max 20 words each, action items only"</a:t>
-            </a:r>
-          </a:p>
-          <a:p>
-            <a:pPr>
-              <a:spcAft>
-                <a:spcPts val="800"/>
-              </a:spcAft>
-              <a:defRPr sz="1800">
-                <a:solidFill>
-                  <a:srgbClr val="333333"/>
-                </a:solidFill>
-              </a:defRPr>
-            </a:pPr>
-            <a:r>
-              <a:t>2. FEW-SHOT EXAMPLES — Show 2-3 input→output examples, then the real input</a:t>
-            </a:r>
-          </a:p>
-          <a:p>
-            <a:pPr>
-              <a:spcAft>
-                <a:spcPts val="800"/>
-              </a:spcAft>
-              <a:defRPr sz="1800">
-                <a:solidFill>
-                  <a:srgbClr val="333333"/>
-                </a:solidFill>
-              </a:defRPr>
-            </a:pPr>
-            <a:r>
-              <a:t>3. CHAIN-OF-THOUGHT — "Think step by step" measurably improves reasoning accuracy</a:t>
-            </a:r>
-          </a:p>
-          <a:p>
-            <a:pPr>
-              <a:spcAft>
-                <a:spcPts val="800"/>
-              </a:spcAft>
-              <a:defRPr sz="1800">
-                <a:solidFill>
-                  <a:srgbClr val="333333"/>
-                </a:solidFill>
-              </a:defRPr>
-            </a:pPr>
-            <a:r>
-              <a:t>4. OUTPUT FORMAT — "Respond in this exact JSON: {summary, score}" prevents markdown wrapping</a:t>
-            </a:r>
-          </a:p>
-          <a:p>
-            <a:pPr>
-              <a:spcAft>
-                <a:spcPts val="800"/>
-              </a:spcAft>
-              <a:defRPr sz="1800">
-                <a:solidFill>
-                  <a:srgbClr val="333333"/>
-                </a:solidFill>
-              </a:defRPr>
-            </a:pPr>
-            <a:r>
-              <a:t>5. NEGATIVE CONSTRAINTS — "Do NOT include disclaimers" is often more effective than positive</a:t>
+              <a:t>response = client.images.generate(</a:t>
+            </a:r>
+            <a:br/>
+            <a:r>
+              <a:t>    model="gpt-image-1.5",</a:t>
+            </a:r>
+            <a:br/>
+            <a:r>
+              <a:t>    prompt="A serene mountain landscape at sunset, photorealistic",</a:t>
+            </a:r>
+            <a:br/>
+            <a:r>
+              <a:t>    size="1024x1024",</a:t>
+            </a:r>
+            <a:br/>
+            <a:r>
+              <a:t>    quality="high",</a:t>
+            </a:r>
+            <a:br/>
+            <a:r>
+              <a:t>    n=1,</a:t>
+            </a:r>
+            <a:br/>
+            <a:r>
+              <a:t>)</a:t>
+            </a:r>
+            <a:br/>
+            <a:r>
+              <a:t>image_url = response.data[0].url</a:t>
+            </a:r>
+            <a:br/>
+            <a:br/>
+            <a:r>
+              <a:t># TTS Example</a:t>
+            </a:r>
+            <a:br/>
+            <a:r>
+              <a:t>speech = client.audio.speech.create(</a:t>
+            </a:r>
+            <a:br/>
+            <a:r>
+              <a:t>    model="tts-1",</a:t>
+            </a:r>
+            <a:br/>
+            <a:r>
+              <a:t>    voice="nova",</a:t>
+            </a:r>
+            <a:br/>
+            <a:r>
+              <a:t>    input="Hello, welcome to the AI course!",</a:t>
+            </a:r>
+            <a:br/>
+            <a:r>
+              <a:t>)</a:t>
+            </a:r>
+            <a:br/>
+            <a:r>
+              <a:t>speech.stream_to_file("welcome.mp3")</a:t>
             </a:r>
           </a:p>
         </p:txBody>
@@ -5429,17 +5618,9 @@
 </p:sld>
 </file>
 
-<file path=ppt/slides/slide4.xml><?xml version="1.0" encoding="utf-8"?>
+<file path=ppt/slides/slide14.xml><?xml version="1.0" encoding="utf-8"?>
 <p:sld xmlns:a="http://schemas.openxmlformats.org/drawingml/2006/main" xmlns:p="http://schemas.openxmlformats.org/presentationml/2006/main" xmlns:r="http://schemas.openxmlformats.org/officeDocument/2006/relationships">
   <p:cSld>
-    <p:bg>
-      <p:bgPr>
-        <a:solidFill>
-          <a:srgbClr val="FFFFFF"/>
-        </a:solidFill>
-        <a:effectLst/>
-      </p:bgPr>
-    </p:bg>
     <p:spTree>
       <p:nvGrpSpPr>
         <p:cNvPr id="1" name=""/>
@@ -5456,7 +5637,7 @@
         <p:spPr>
           <a:xfrm>
             <a:off x="0" y="0"/>
-            <a:ext cx="12191695" cy="54864"/>
+            <a:ext cx="12191695" cy="73152"/>
           </a:xfrm>
           <a:prstGeom prst="rect">
             <a:avLst/>
@@ -5499,7 +5680,7 @@
         <p:spPr>
           <a:xfrm>
             <a:off x="731520" y="274320"/>
-            <a:ext cx="10515600" cy="731520"/>
+            <a:ext cx="10728655" cy="822960"/>
           </a:xfrm>
           <a:prstGeom prst="rect">
             <a:avLst/>
@@ -5512,15 +5693,15 @@
           </a:bodyPr>
           <a:lstStyle/>
           <a:p>
-            <a:pPr>
-              <a:defRPr sz="2800" b="1">
+            <a:pPr algn="l">
+              <a:defRPr sz="3200" b="1">
                 <a:solidFill>
                   <a:srgbClr val="1B2A4A"/>
                 </a:solidFill>
               </a:defRPr>
             </a:pPr>
             <a:r>
-              <a:t>Advanced Prompting — Role Stacking &amp; XML Tags</a:t>
+              <a:t>Hands-On: Multimodal App</a:t>
             </a:r>
           </a:p>
         </p:txBody>
@@ -5533,8 +5714,8 @@
         </p:nvSpPr>
         <p:spPr>
           <a:xfrm>
-            <a:off x="731520" y="1188720"/>
-            <a:ext cx="5029200" cy="5029200"/>
+            <a:off x="914400" y="1280160"/>
+            <a:ext cx="10362895" cy="5029200"/>
           </a:xfrm>
           <a:prstGeom prst="rect">
             <a:avLst/>
@@ -5548,82 +5729,148 @@
           <a:lstStyle/>
           <a:p>
             <a:pPr>
+              <a:spcBef>
+                <a:spcPts val="400"/>
+              </a:spcBef>
               <a:spcAft>
                 <a:spcPts val="800"/>
               </a:spcAft>
-              <a:defRPr sz="1800">
+              <a:defRPr sz="2000">
                 <a:solidFill>
                   <a:srgbClr val="333333"/>
                 </a:solidFill>
               </a:defRPr>
             </a:pPr>
             <a:r>
-              <a:t>Role stacking: define multiple expert perspectives in one prompt</a:t>
+              <a:t>multimodal_app.py — analyze images with 3 providers</a:t>
             </a:r>
           </a:p>
           <a:p>
             <a:pPr>
+              <a:spcBef>
+                <a:spcPts val="400"/>
+              </a:spcBef>
               <a:spcAft>
                 <a:spcPts val="800"/>
               </a:spcAft>
-              <a:defRPr sz="1800">
+              <a:defRPr sz="2000">
                 <a:solidFill>
                   <a:srgbClr val="333333"/>
                 </a:solidFill>
               </a:defRPr>
             </a:pPr>
             <a:r>
-              <a:t>Structured reasoning: &lt;analysis&gt; for thinking, &lt;answer&gt; for output</a:t>
+              <a:t>Combines vision + structured output + TTS</a:t>
             </a:r>
           </a:p>
           <a:p>
             <a:pPr>
+              <a:spcBef>
+                <a:spcPts val="400"/>
+              </a:spcBef>
               <a:spcAft>
                 <a:spcPts val="800"/>
               </a:spcAft>
-              <a:defRPr sz="1800">
+              <a:defRPr sz="2000">
                 <a:solidFill>
                   <a:srgbClr val="333333"/>
                 </a:solidFill>
               </a:defRPr>
             </a:pPr>
             <a:r>
-              <a:t>XML tags work great with Claude, good with all models — clear delimiters</a:t>
+              <a:t>Run: python multimodal_app.py photo.jpg --tts</a:t>
             </a:r>
           </a:p>
           <a:p>
             <a:pPr>
+              <a:spcBef>
+                <a:spcPts val="400"/>
+              </a:spcBef>
               <a:spcAft>
                 <a:spcPts val="800"/>
               </a:spcAft>
-              <a:defRPr sz="1800">
+              <a:defRPr sz="2000">
                 <a:solidFill>
                   <a:srgbClr val="333333"/>
                 </a:solidFill>
               </a:defRPr>
             </a:pPr>
             <a:r>
-              <a:t>Separate code, context, and instructions with distinct tags</a:t>
-            </a:r>
-          </a:p>
-        </p:txBody>
-      </p:sp>
-      <p:sp>
-        <p:nvSpPr>
-          <p:cNvPr id="5" name="Rounded Rectangle 4"/>
+              <a:t>Compares GPT-4.1 vs Sonnet 4.6 vs Gemini 2.5 Flash</a:t>
+            </a:r>
+          </a:p>
+          <a:p>
+            <a:pPr>
+              <a:spcBef>
+                <a:spcPts val="400"/>
+              </a:spcBef>
+              <a:spcAft>
+                <a:spcPts val="800"/>
+              </a:spcAft>
+              <a:defRPr sz="2000">
+                <a:solidFill>
+                  <a:srgbClr val="333333"/>
+                </a:solidFill>
+              </a:defRPr>
+            </a:pPr>
+            <a:r>
+              <a:t>Exercise: try different images, compare structured results</a:t>
+            </a:r>
+          </a:p>
+          <a:p>
+            <a:pPr>
+              <a:spcBef>
+                <a:spcPts val="400"/>
+              </a:spcBef>
+              <a:spcAft>
+                <a:spcPts val="800"/>
+              </a:spcAft>
+              <a:defRPr sz="2000">
+                <a:solidFill>
+                  <a:srgbClr val="333333"/>
+                </a:solidFill>
+              </a:defRPr>
+            </a:pPr>
+            <a:r>
+              <a:t>Bonus: python multimodal_app.py --generate 'a cat on mars'</a:t>
+            </a:r>
+          </a:p>
+        </p:txBody>
+      </p:sp>
+    </p:spTree>
+  </p:cSld>
+  <p:clrMapOvr>
+    <a:masterClrMapping/>
+  </p:clrMapOvr>
+</p:sld>
+</file>
+
+<file path=ppt/slides/slide15.xml><?xml version="1.0" encoding="utf-8"?>
+<p:sld xmlns:a="http://schemas.openxmlformats.org/drawingml/2006/main" xmlns:p="http://schemas.openxmlformats.org/presentationml/2006/main" xmlns:r="http://schemas.openxmlformats.org/officeDocument/2006/relationships">
+  <p:cSld>
+    <p:spTree>
+      <p:nvGrpSpPr>
+        <p:cNvPr id="1" name=""/>
+        <p:cNvGrpSpPr/>
+        <p:nvPr/>
+      </p:nvGrpSpPr>
+      <p:grpSpPr/>
+      <p:sp>
+        <p:nvSpPr>
+          <p:cNvPr id="2" name="Rectangle 1"/>
           <p:cNvSpPr/>
           <p:nvPr/>
         </p:nvSpPr>
         <p:spPr>
           <a:xfrm>
-            <a:off x="6217920" y="1188720"/>
-            <a:ext cx="5486400" cy="4572000"/>
-          </a:xfrm>
-          <a:prstGeom prst="roundRect">
+            <a:off x="0" y="0"/>
+            <a:ext cx="12191695" cy="73152"/>
+          </a:xfrm>
+          <a:prstGeom prst="rect">
             <a:avLst/>
           </a:prstGeom>
           <a:solidFill>
-            <a:srgbClr val="F0F0F0"/>
+            <a:srgbClr val="0096D6"/>
           </a:solidFill>
           <a:ln>
             <a:noFill/>
@@ -5653,14 +5900,14 @@
       </p:sp>
       <p:sp>
         <p:nvSpPr>
-          <p:cNvPr id="6" name="TextBox 5"/>
+          <p:cNvPr id="3" name="TextBox 2"/>
           <p:cNvSpPr txBox="1"/>
           <p:nvPr/>
         </p:nvSpPr>
         <p:spPr>
           <a:xfrm>
-            <a:off x="6400800" y="1325880"/>
-            <a:ext cx="5120640" cy="4297680"/>
+            <a:off x="731520" y="274320"/>
+            <a:ext cx="10728655" cy="822960"/>
           </a:xfrm>
           <a:prstGeom prst="rect">
             <a:avLst/>
@@ -5673,62 +5920,146 @@
           </a:bodyPr>
           <a:lstStyle/>
           <a:p>
+            <a:pPr algn="l">
+              <a:defRPr sz="3200" b="1">
+                <a:solidFill>
+                  <a:srgbClr val="1B2A4A"/>
+                </a:solidFill>
+              </a:defRPr>
+            </a:pPr>
+            <a:r>
+              <a:t>Key Takeaways — Session 2</a:t>
+            </a:r>
+          </a:p>
+        </p:txBody>
+      </p:sp>
+      <p:sp>
+        <p:nvSpPr>
+          <p:cNvPr id="4" name="TextBox 3"/>
+          <p:cNvSpPr txBox="1"/>
+          <p:nvPr/>
+        </p:nvSpPr>
+        <p:spPr>
+          <a:xfrm>
+            <a:off x="914400" y="1280160"/>
+            <a:ext cx="10362895" cy="5029200"/>
+          </a:xfrm>
+          <a:prstGeom prst="rect">
+            <a:avLst/>
+          </a:prstGeom>
+          <a:noFill/>
+        </p:spPr>
+        <p:txBody>
+          <a:bodyPr wrap="square">
+            <a:spAutoFit/>
+          </a:bodyPr>
+          <a:lstStyle/>
+          <a:p>
             <a:pPr>
-              <a:defRPr sz="1100">
+              <a:spcBef>
+                <a:spcPts val="400"/>
+              </a:spcBef>
+              <a:spcAft>
+                <a:spcPts val="800"/>
+              </a:spcAft>
+              <a:defRPr sz="2000">
                 <a:solidFill>
                   <a:srgbClr val="333333"/>
                 </a:solidFill>
-                <a:latin typeface="Consolas"/>
               </a:defRPr>
             </a:pPr>
             <a:r>
-              <a:t>system = """You are three experts debating:</a:t>
-            </a:r>
-            <a:br/>
-            <a:r>
-              <a:t>1. Security engineer — focused on risks</a:t>
-            </a:r>
-            <a:br/>
-            <a:r>
-              <a:t>2. Product manager — focused on UX</a:t>
-            </a:r>
-            <a:br/>
-            <a:r>
-              <a:t>3. Performance engineer — focused on speed</a:t>
-            </a:r>
-            <a:br/>
-            <a:r>
-              <a:t>Give all three perspectives, then recommend."""</a:t>
-            </a:r>
-            <a:br/>
-            <a:br/>
-            <a:r>
-              <a:t>user = """Analyze this code:</a:t>
-            </a:r>
-            <a:br/>
-            <a:r>
-              <a:t>&lt;code&gt;{code_here}&lt;/code&gt;</a:t>
-            </a:r>
-            <a:br/>
-            <a:r>
-              <a:t>&lt;context&gt;Production, 10K req/s&lt;/context&gt;"""</a:t>
-            </a:r>
-            <a:br/>
-            <a:br/>
-            <a:r>
-              <a:t># Structured reasoning template</a:t>
-            </a:r>
-            <a:br/>
-            <a:r>
-              <a:t>system = """For each question:</a:t>
-            </a:r>
-            <a:br/>
-            <a:r>
-              <a:t>&lt;analysis&gt;[step-by-step reasoning]&lt;/analysis&gt;</a:t>
-            </a:r>
-            <a:br/>
-            <a:r>
-              <a:t>&lt;answer&gt;[concise final answer]&lt;/answer&gt;""" </a:t>
+              <a:t>System prompts + few-shot + CoT = core prompt engineering</a:t>
+            </a:r>
+          </a:p>
+          <a:p>
+            <a:pPr>
+              <a:spcBef>
+                <a:spcPts val="400"/>
+              </a:spcBef>
+              <a:spcAft>
+                <a:spcPts val="800"/>
+              </a:spcAft>
+              <a:defRPr sz="2000">
+                <a:solidFill>
+                  <a:srgbClr val="333333"/>
+                </a:solidFill>
+              </a:defRPr>
+            </a:pPr>
+            <a:r>
+              <a:t>Structured output: OpenAI native, Anthropic tool-trick, Gemini schema</a:t>
+            </a:r>
+          </a:p>
+          <a:p>
+            <a:pPr>
+              <a:spcBef>
+                <a:spcPts val="400"/>
+              </a:spcBef>
+              <a:spcAft>
+                <a:spcPts val="800"/>
+              </a:spcAft>
+              <a:defRPr sz="2000">
+                <a:solidFill>
+                  <a:srgbClr val="333333"/>
+                </a:solidFill>
+              </a:defRPr>
+            </a:pPr>
+            <a:r>
+              <a:t>Vision works across all providers (slightly different formats)</a:t>
+            </a:r>
+          </a:p>
+          <a:p>
+            <a:pPr>
+              <a:spcBef>
+                <a:spcPts val="400"/>
+              </a:spcBef>
+              <a:spcAft>
+                <a:spcPts val="800"/>
+              </a:spcAft>
+              <a:defRPr sz="2000">
+                <a:solidFill>
+                  <a:srgbClr val="333333"/>
+                </a:solidFill>
+              </a:defRPr>
+            </a:pPr>
+            <a:r>
+              <a:t>Audio: Whisper (STT), tts-1 (TTS), gpt-audio-1.5 (realtime)</a:t>
+            </a:r>
+          </a:p>
+          <a:p>
+            <a:pPr>
+              <a:spcBef>
+                <a:spcPts val="400"/>
+              </a:spcBef>
+              <a:spcAft>
+                <a:spcPts val="800"/>
+              </a:spcAft>
+              <a:defRPr sz="2000">
+                <a:solidFill>
+                  <a:srgbClr val="333333"/>
+                </a:solidFill>
+              </a:defRPr>
+            </a:pPr>
+            <a:r>
+              <a:t>Image gen: GPT Image 1.5 via simple API call</a:t>
+            </a:r>
+          </a:p>
+          <a:p>
+            <a:pPr>
+              <a:spcBef>
+                <a:spcPts val="400"/>
+              </a:spcBef>
+              <a:spcAft>
+                <a:spcPts val="800"/>
+              </a:spcAft>
+              <a:defRPr sz="2000">
+                <a:solidFill>
+                  <a:srgbClr val="333333"/>
+                </a:solidFill>
+              </a:defRPr>
+            </a:pPr>
+            <a:r>
+              <a:t>Next session: tool use &amp; function calling</a:t>
             </a:r>
           </a:p>
         </p:txBody>
@@ -5741,17 +6072,9 @@
 </p:sld>
 </file>
 
-<file path=ppt/slides/slide5.xml><?xml version="1.0" encoding="utf-8"?>
+<file path=ppt/slides/slide2.xml><?xml version="1.0" encoding="utf-8"?>
 <p:sld xmlns:a="http://schemas.openxmlformats.org/drawingml/2006/main" xmlns:p="http://schemas.openxmlformats.org/presentationml/2006/main" xmlns:r="http://schemas.openxmlformats.org/officeDocument/2006/relationships">
   <p:cSld>
-    <p:bg>
-      <p:bgPr>
-        <a:solidFill>
-          <a:srgbClr val="FFFFFF"/>
-        </a:solidFill>
-        <a:effectLst/>
-      </p:bgPr>
-    </p:bg>
     <p:spTree>
       <p:nvGrpSpPr>
         <p:cNvPr id="1" name=""/>
@@ -5768,7 +6091,7 @@
         <p:spPr>
           <a:xfrm>
             <a:off x="0" y="0"/>
-            <a:ext cx="12191695" cy="54864"/>
+            <a:ext cx="12191695" cy="73152"/>
           </a:xfrm>
           <a:prstGeom prst="rect">
             <a:avLst/>
@@ -5811,7 +6134,7 @@
         <p:spPr>
           <a:xfrm>
             <a:off x="731520" y="274320"/>
-            <a:ext cx="10515600" cy="731520"/>
+            <a:ext cx="10728655" cy="822960"/>
           </a:xfrm>
           <a:prstGeom prst="rect">
             <a:avLst/>
@@ -5824,15 +6147,15 @@
           </a:bodyPr>
           <a:lstStyle/>
           <a:p>
-            <a:pPr>
-              <a:defRPr sz="2800" b="1">
+            <a:pPr algn="l">
+              <a:defRPr sz="3200" b="1">
                 <a:solidFill>
                   <a:srgbClr val="1B2A4A"/>
                 </a:solidFill>
               </a:defRPr>
             </a:pPr>
             <a:r>
-              <a:t>Structured Output — The Problem</a:t>
+              <a:t>Prompt Engineering Fundamentals</a:t>
             </a:r>
           </a:p>
         </p:txBody>
@@ -5845,8 +6168,8 @@
         </p:nvSpPr>
         <p:spPr>
           <a:xfrm>
-            <a:off x="731520" y="1188720"/>
-            <a:ext cx="10515600" cy="5029200"/>
+            <a:off x="914400" y="1280160"/>
+            <a:ext cx="10362895" cy="5029200"/>
           </a:xfrm>
           <a:prstGeom prst="rect">
             <a:avLst/>
@@ -5860,62 +6183,110 @@
           <a:lstStyle/>
           <a:p>
             <a:pPr>
+              <a:spcBef>
+                <a:spcPts val="400"/>
+              </a:spcBef>
               <a:spcAft>
                 <a:spcPts val="800"/>
               </a:spcAft>
-              <a:defRPr sz="1800">
+              <a:defRPr sz="2000">
                 <a:solidFill>
                   <a:srgbClr val="333333"/>
                 </a:solidFill>
               </a:defRPr>
             </a:pPr>
             <a:r>
-              <a:t>You want: {"name": "Alice", "age": 30} — clean JSON</a:t>
+              <a:t>System prompt: sets persona, rules, and constraints</a:t>
             </a:r>
           </a:p>
           <a:p>
             <a:pPr>
+              <a:spcBef>
+                <a:spcPts val="400"/>
+              </a:spcBef>
               <a:spcAft>
                 <a:spcPts val="800"/>
               </a:spcAft>
-              <a:defRPr sz="1800">
+              <a:defRPr sz="2000">
                 <a:solidFill>
                   <a:srgbClr val="333333"/>
                 </a:solidFill>
               </a:defRPr>
             </a:pPr>
             <a:r>
-              <a:t>You get: "Here's the JSON:\n```json\n{...}" — wrapped in markdown</a:t>
+              <a:t>Few-shot examples: show the model what you want</a:t>
             </a:r>
           </a:p>
           <a:p>
             <a:pPr>
+              <a:spcBef>
+                <a:spcPts val="400"/>
+              </a:spcBef>
               <a:spcAft>
                 <a:spcPts val="800"/>
               </a:spcAft>
-              <a:defRPr sz="1800">
+              <a:defRPr sz="2000">
                 <a:solidFill>
                   <a:srgbClr val="333333"/>
                 </a:solidFill>
               </a:defRPr>
             </a:pPr>
             <a:r>
-              <a:t>Or worse: wrong types, missing fields, prose instead of data</a:t>
+              <a:t>Chain-of-thought: 'Think step by step' improves reasoning</a:t>
             </a:r>
           </a:p>
           <a:p>
             <a:pPr>
+              <a:spcBef>
+                <a:spcPts val="400"/>
+              </a:spcBef>
               <a:spcAft>
                 <a:spcPts val="800"/>
               </a:spcAft>
-              <a:defRPr sz="1800">
+              <a:defRPr sz="2000">
                 <a:solidFill>
                   <a:srgbClr val="333333"/>
                 </a:solidFill>
               </a:defRPr>
             </a:pPr>
             <a:r>
-              <a:t>Solutions ranked: prompt alone (unreliable) → JSON mode → response_format → tool use (most reliable)</a:t>
+              <a:t>Be specific: 'in 3 bullet points' beats 'briefly'</a:t>
+            </a:r>
+          </a:p>
+          <a:p>
+            <a:pPr>
+              <a:spcBef>
+                <a:spcPts val="400"/>
+              </a:spcBef>
+              <a:spcAft>
+                <a:spcPts val="800"/>
+              </a:spcAft>
+              <a:defRPr sz="2000">
+                <a:solidFill>
+                  <a:srgbClr val="333333"/>
+                </a:solidFill>
+              </a:defRPr>
+            </a:pPr>
+            <a:r>
+              <a:t>Negative instructions work: 'Do NOT include disclaimers'</a:t>
+            </a:r>
+          </a:p>
+          <a:p>
+            <a:pPr>
+              <a:spcBef>
+                <a:spcPts val="400"/>
+              </a:spcBef>
+              <a:spcAft>
+                <a:spcPts val="800"/>
+              </a:spcAft>
+              <a:defRPr sz="2000">
+                <a:solidFill>
+                  <a:srgbClr val="333333"/>
+                </a:solidFill>
+              </a:defRPr>
+            </a:pPr>
+            <a:r>
+              <a:t>Temperature: 0 = deterministic, 1+ = creative</a:t>
             </a:r>
           </a:p>
         </p:txBody>
@@ -5928,17 +6299,9 @@
 </p:sld>
 </file>
 
-<file path=ppt/slides/slide6.xml><?xml version="1.0" encoding="utf-8"?>
+<file path=ppt/slides/slide3.xml><?xml version="1.0" encoding="utf-8"?>
 <p:sld xmlns:a="http://schemas.openxmlformats.org/drawingml/2006/main" xmlns:p="http://schemas.openxmlformats.org/presentationml/2006/main" xmlns:r="http://schemas.openxmlformats.org/officeDocument/2006/relationships">
   <p:cSld>
-    <p:bg>
-      <p:bgPr>
-        <a:solidFill>
-          <a:srgbClr val="FFFFFF"/>
-        </a:solidFill>
-        <a:effectLst/>
-      </p:bgPr>
-    </p:bg>
     <p:spTree>
       <p:nvGrpSpPr>
         <p:cNvPr id="1" name=""/>
@@ -5955,7 +6318,7 @@
         <p:spPr>
           <a:xfrm>
             <a:off x="0" y="0"/>
-            <a:ext cx="12191695" cy="54864"/>
+            <a:ext cx="12191695" cy="73152"/>
           </a:xfrm>
           <a:prstGeom prst="rect">
             <a:avLst/>
@@ -5998,7 +6361,7 @@
         <p:spPr>
           <a:xfrm>
             <a:off x="731520" y="274320"/>
-            <a:ext cx="10515600" cy="731520"/>
+            <a:ext cx="10728655" cy="822960"/>
           </a:xfrm>
           <a:prstGeom prst="rect">
             <a:avLst/>
@@ -6011,35 +6374,184 @@
           </a:bodyPr>
           <a:lstStyle/>
           <a:p>
+            <a:pPr algn="l">
+              <a:defRPr sz="3200" b="1">
+                <a:solidFill>
+                  <a:srgbClr val="1B2A4A"/>
+                </a:solidFill>
+              </a:defRPr>
+            </a:pPr>
+            <a:r>
+              <a:t>System Prompt Best Practices</a:t>
+            </a:r>
+          </a:p>
+        </p:txBody>
+      </p:sp>
+      <p:sp>
+        <p:nvSpPr>
+          <p:cNvPr id="4" name="TextBox 3"/>
+          <p:cNvSpPr txBox="1"/>
+          <p:nvPr/>
+        </p:nvSpPr>
+        <p:spPr>
+          <a:xfrm>
+            <a:off x="914400" y="1280160"/>
+            <a:ext cx="10362895" cy="5029200"/>
+          </a:xfrm>
+          <a:prstGeom prst="rect">
+            <a:avLst/>
+          </a:prstGeom>
+          <a:noFill/>
+        </p:spPr>
+        <p:txBody>
+          <a:bodyPr wrap="square">
+            <a:spAutoFit/>
+          </a:bodyPr>
+          <a:lstStyle/>
+          <a:p>
             <a:pPr>
-              <a:defRPr sz="2800" b="1">
-                <a:solidFill>
-                  <a:srgbClr val="1B2A4A"/>
+              <a:spcBef>
+                <a:spcPts val="400"/>
+              </a:spcBef>
+              <a:spcAft>
+                <a:spcPts val="800"/>
+              </a:spcAft>
+              <a:defRPr sz="2000">
+                <a:solidFill>
+                  <a:srgbClr val="333333"/>
                 </a:solidFill>
               </a:defRPr>
             </a:pPr>
             <a:r>
-              <a:t>OpenAI Structured Output — Cleanest Approach</a:t>
-            </a:r>
-          </a:p>
-        </p:txBody>
-      </p:sp>
-      <p:sp>
-        <p:nvSpPr>
-          <p:cNvPr id="4" name="Rounded Rectangle 3"/>
+              <a:t>Define role: 'You are a senior Python developer'</a:t>
+            </a:r>
+          </a:p>
+          <a:p>
+            <a:pPr>
+              <a:spcBef>
+                <a:spcPts val="400"/>
+              </a:spcBef>
+              <a:spcAft>
+                <a:spcPts val="800"/>
+              </a:spcAft>
+              <a:defRPr sz="2000">
+                <a:solidFill>
+                  <a:srgbClr val="333333"/>
+                </a:solidFill>
+              </a:defRPr>
+            </a:pPr>
+            <a:r>
+              <a:t>Set format: 'Respond in JSON with keys: answer, confidence'</a:t>
+            </a:r>
+          </a:p>
+          <a:p>
+            <a:pPr>
+              <a:spcBef>
+                <a:spcPts val="400"/>
+              </a:spcBef>
+              <a:spcAft>
+                <a:spcPts val="800"/>
+              </a:spcAft>
+              <a:defRPr sz="2000">
+                <a:solidFill>
+                  <a:srgbClr val="333333"/>
+                </a:solidFill>
+              </a:defRPr>
+            </a:pPr>
+            <a:r>
+              <a:t>Add constraints: 'Maximum 100 words. No markdown.'</a:t>
+            </a:r>
+          </a:p>
+          <a:p>
+            <a:pPr>
+              <a:spcBef>
+                <a:spcPts val="400"/>
+              </a:spcBef>
+              <a:spcAft>
+                <a:spcPts val="800"/>
+              </a:spcAft>
+              <a:defRPr sz="2000">
+                <a:solidFill>
+                  <a:srgbClr val="333333"/>
+                </a:solidFill>
+              </a:defRPr>
+            </a:pPr>
+            <a:r>
+              <a:t>Include examples in the system prompt for consistency</a:t>
+            </a:r>
+          </a:p>
+          <a:p>
+            <a:pPr>
+              <a:spcBef>
+                <a:spcPts val="400"/>
+              </a:spcBef>
+              <a:spcAft>
+                <a:spcPts val="800"/>
+              </a:spcAft>
+              <a:defRPr sz="2000">
+                <a:solidFill>
+                  <a:srgbClr val="333333"/>
+                </a:solidFill>
+              </a:defRPr>
+            </a:pPr>
+            <a:r>
+              <a:t>Anthropic: system is a separate parameter (not in messages)</a:t>
+            </a:r>
+          </a:p>
+          <a:p>
+            <a:pPr>
+              <a:spcBef>
+                <a:spcPts val="400"/>
+              </a:spcBef>
+              <a:spcAft>
+                <a:spcPts val="800"/>
+              </a:spcAft>
+              <a:defRPr sz="2000">
+                <a:solidFill>
+                  <a:srgbClr val="333333"/>
+                </a:solidFill>
+              </a:defRPr>
+            </a:pPr>
+            <a:r>
+              <a:t>Test with edge cases — adversarial inputs reveal weaknesses</a:t>
+            </a:r>
+          </a:p>
+        </p:txBody>
+      </p:sp>
+    </p:spTree>
+  </p:cSld>
+  <p:clrMapOvr>
+    <a:masterClrMapping/>
+  </p:clrMapOvr>
+</p:sld>
+</file>
+
+<file path=ppt/slides/slide4.xml><?xml version="1.0" encoding="utf-8"?>
+<p:sld xmlns:a="http://schemas.openxmlformats.org/drawingml/2006/main" xmlns:p="http://schemas.openxmlformats.org/presentationml/2006/main" xmlns:r="http://schemas.openxmlformats.org/officeDocument/2006/relationships">
+  <p:cSld>
+    <p:spTree>
+      <p:nvGrpSpPr>
+        <p:cNvPr id="1" name=""/>
+        <p:cNvGrpSpPr/>
+        <p:nvPr/>
+      </p:nvGrpSpPr>
+      <p:grpSpPr/>
+      <p:sp>
+        <p:nvSpPr>
+          <p:cNvPr id="2" name="Rectangle 1"/>
           <p:cNvSpPr/>
           <p:nvPr/>
         </p:nvSpPr>
         <p:spPr>
           <a:xfrm>
-            <a:off x="548640" y="1188720"/>
-            <a:ext cx="10972800" cy="4754880"/>
-          </a:xfrm>
-          <a:prstGeom prst="roundRect">
+            <a:off x="0" y="0"/>
+            <a:ext cx="12191695" cy="73152"/>
+          </a:xfrm>
+          <a:prstGeom prst="rect">
             <a:avLst/>
           </a:prstGeom>
           <a:solidFill>
-            <a:srgbClr val="F0F0F0"/>
+            <a:srgbClr val="0096D6"/>
           </a:solidFill>
           <a:ln>
             <a:noFill/>
@@ -6069,14 +6581,14 @@
       </p:sp>
       <p:sp>
         <p:nvSpPr>
-          <p:cNvPr id="5" name="TextBox 4"/>
+          <p:cNvPr id="3" name="TextBox 2"/>
           <p:cNvSpPr txBox="1"/>
           <p:nvPr/>
         </p:nvSpPr>
         <p:spPr>
           <a:xfrm>
-            <a:off x="822960" y="1371600"/>
-            <a:ext cx="10424160" cy="4389120"/>
+            <a:off x="731520" y="274320"/>
+            <a:ext cx="10728655" cy="731520"/>
           </a:xfrm>
           <a:prstGeom prst="rect">
             <a:avLst/>
@@ -6084,112 +6596,286 @@
           <a:noFill/>
         </p:spPr>
         <p:txBody>
+          <a:bodyPr wrap="none">
+            <a:spAutoFit/>
+          </a:bodyPr>
+          <a:lstStyle/>
+          <a:p>
+            <a:pPr>
+              <a:defRPr sz="3200" b="1">
+                <a:solidFill>
+                  <a:srgbClr val="1B2A4A"/>
+                </a:solidFill>
+              </a:defRPr>
+            </a:pPr>
+            <a:r>
+              <a:t>Structured Output — Three Approaches</a:t>
+            </a:r>
+          </a:p>
+        </p:txBody>
+      </p:sp>
+      <p:sp>
+        <p:nvSpPr>
+          <p:cNvPr id="4" name="TextBox 3"/>
+          <p:cNvSpPr txBox="1"/>
+          <p:nvPr/>
+        </p:nvSpPr>
+        <p:spPr>
+          <a:xfrm>
+            <a:off x="731520" y="1188720"/>
+            <a:ext cx="5029200" cy="457200"/>
+          </a:xfrm>
+          <a:prstGeom prst="rect">
+            <a:avLst/>
+          </a:prstGeom>
+          <a:noFill/>
+        </p:spPr>
+        <p:txBody>
+          <a:bodyPr wrap="none">
+            <a:spAutoFit/>
+          </a:bodyPr>
+          <a:lstStyle/>
+          <a:p>
+            <a:pPr>
+              <a:defRPr sz="2200" b="1">
+                <a:solidFill>
+                  <a:srgbClr val="0096D6"/>
+                </a:solidFill>
+              </a:defRPr>
+            </a:pPr>
+            <a:r>
+              <a:t>OpenAI (Native)</a:t>
+            </a:r>
+          </a:p>
+        </p:txBody>
+      </p:sp>
+      <p:sp>
+        <p:nvSpPr>
+          <p:cNvPr id="5" name="TextBox 4"/>
+          <p:cNvSpPr txBox="1"/>
+          <p:nvPr/>
+        </p:nvSpPr>
+        <p:spPr>
+          <a:xfrm>
+            <a:off x="731520" y="1737360"/>
+            <a:ext cx="5029200" cy="4572000"/>
+          </a:xfrm>
+          <a:prstGeom prst="rect">
+            <a:avLst/>
+          </a:prstGeom>
+          <a:noFill/>
+        </p:spPr>
+        <p:txBody>
           <a:bodyPr wrap="square">
             <a:spAutoFit/>
           </a:bodyPr>
           <a:lstStyle/>
           <a:p>
             <a:pPr>
-              <a:defRPr sz="1200">
+              <a:spcAft>
+                <a:spcPts val="600"/>
+              </a:spcAft>
+              <a:defRPr sz="1800">
                 <a:solidFill>
                   <a:srgbClr val="333333"/>
                 </a:solidFill>
-                <a:latin typeface="Consolas"/>
               </a:defRPr>
             </a:pPr>
             <a:r>
-              <a:t>from pydantic import BaseModel</a:t>
-            </a:r>
-            <a:br/>
-            <a:r>
-              <a:t>from openai import OpenAI</a:t>
-            </a:r>
-            <a:br/>
-            <a:br/>
-            <a:r>
-              <a:t>class UserProfile(BaseModel):</a:t>
-            </a:r>
-            <a:br/>
-            <a:r>
-              <a:t>    name: str</a:t>
-            </a:r>
-            <a:br/>
-            <a:r>
-              <a:t>    age: int</a:t>
-            </a:r>
-            <a:br/>
-            <a:r>
-              <a:t>    skills: list[str]</a:t>
-            </a:r>
-            <a:br/>
-            <a:r>
-              <a:t>    experience_years: float</a:t>
-            </a:r>
-            <a:br/>
-            <a:r>
-              <a:t>    is_employed: bool</a:t>
-            </a:r>
-            <a:br/>
-            <a:br/>
-            <a:r>
-              <a:t>client = OpenAI()</a:t>
-            </a:r>
-            <a:br/>
-            <a:r>
-              <a:t>response = client.beta.chat.completions.parse(</a:t>
-            </a:r>
-            <a:br/>
-            <a:r>
-              <a:t>    model="gpt-5.2",</a:t>
-            </a:r>
-            <a:br/>
-            <a:r>
-              <a:t>    messages=[</a:t>
-            </a:r>
-            <a:br/>
-            <a:r>
-              <a:t>        {"role": "system", "content": "Extract user profile from text."},</a:t>
-            </a:r>
-            <a:br/>
-            <a:r>
-              <a:t>        {"role": "user", "content": "Alice is 30, knows Python and SQL, "</a:t>
-            </a:r>
-            <a:br/>
-            <a:r>
-              <a:t>         "8.5 years experience, works at Acme Corp."}</a:t>
-            </a:r>
-            <a:br/>
-            <a:r>
-              <a:t>    ],</a:t>
-            </a:r>
-            <a:br/>
-            <a:r>
-              <a:t>    response_format=UserProfile,  # ← Pydantic model!</a:t>
-            </a:r>
-            <a:br/>
-            <a:r>
-              <a:t>)</a:t>
-            </a:r>
-            <a:br/>
-            <a:br/>
-            <a:r>
-              <a:t>profile = response.choices[0].message.parsed  # Already a Python object!</a:t>
-            </a:r>
-            <a:br/>
-            <a:r>
-              <a:t>print(profile.name)        # "Alice"</a:t>
-            </a:r>
-            <a:br/>
-            <a:r>
-              <a:t>print(profile.skills)      # ["Python", "SQL"]</a:t>
-            </a:r>
-            <a:br/>
-            <a:r>
-              <a:t>print(profile.is_employed)  # True</a:t>
-            </a:r>
-            <a:br/>
-            <a:r>
-              <a:t># Uses constrained decoding — model CANNOT produce invalid output</a:t>
+              <a:t>response_format=YourPydanticModel</a:t>
+            </a:r>
+          </a:p>
+          <a:p>
+            <a:pPr>
+              <a:spcAft>
+                <a:spcPts val="600"/>
+              </a:spcAft>
+              <a:defRPr sz="1800">
+                <a:solidFill>
+                  <a:srgbClr val="333333"/>
+                </a:solidFill>
+              </a:defRPr>
+            </a:pPr>
+            <a:r>
+              <a:t>Guaranteed valid JSON matching schema</a:t>
+            </a:r>
+          </a:p>
+          <a:p>
+            <a:pPr>
+              <a:spcAft>
+                <a:spcPts val="600"/>
+              </a:spcAft>
+              <a:defRPr sz="1800">
+                <a:solidFill>
+                  <a:srgbClr val="333333"/>
+                </a:solidFill>
+              </a:defRPr>
+            </a:pPr>
+            <a:r>
+              <a:t>Works with GPT-4.1, GPT-5.2</a:t>
+            </a:r>
+          </a:p>
+          <a:p>
+            <a:pPr>
+              <a:spcAft>
+                <a:spcPts val="600"/>
+              </a:spcAft>
+              <a:defRPr sz="1800">
+                <a:solidFill>
+                  <a:srgbClr val="333333"/>
+                </a:solidFill>
+              </a:defRPr>
+            </a:pPr>
+            <a:r>
+              <a:t>Best: client.beta.chat.completions.parse()</a:t>
+            </a:r>
+          </a:p>
+          <a:p>
+            <a:pPr>
+              <a:spcAft>
+                <a:spcPts val="600"/>
+              </a:spcAft>
+              <a:defRPr sz="1800">
+                <a:solidFill>
+                  <a:srgbClr val="333333"/>
+                </a:solidFill>
+              </a:defRPr>
+            </a:pPr>
+            <a:r>
+              <a:t>Returns .parsed with typed object</a:t>
+            </a:r>
+          </a:p>
+        </p:txBody>
+      </p:sp>
+      <p:sp>
+        <p:nvSpPr>
+          <p:cNvPr id="6" name="TextBox 5"/>
+          <p:cNvSpPr txBox="1"/>
+          <p:nvPr/>
+        </p:nvSpPr>
+        <p:spPr>
+          <a:xfrm>
+            <a:off x="6400800" y="1188720"/>
+            <a:ext cx="5029200" cy="457200"/>
+          </a:xfrm>
+          <a:prstGeom prst="rect">
+            <a:avLst/>
+          </a:prstGeom>
+          <a:noFill/>
+        </p:spPr>
+        <p:txBody>
+          <a:bodyPr wrap="none">
+            <a:spAutoFit/>
+          </a:bodyPr>
+          <a:lstStyle/>
+          <a:p>
+            <a:pPr>
+              <a:defRPr sz="2200" b="1">
+                <a:solidFill>
+                  <a:srgbClr val="0096D6"/>
+                </a:solidFill>
+              </a:defRPr>
+            </a:pPr>
+            <a:r>
+              <a:t>Anthropic (Tool-Use Trick)</a:t>
+            </a:r>
+          </a:p>
+        </p:txBody>
+      </p:sp>
+      <p:sp>
+        <p:nvSpPr>
+          <p:cNvPr id="7" name="TextBox 6"/>
+          <p:cNvSpPr txBox="1"/>
+          <p:nvPr/>
+        </p:nvSpPr>
+        <p:spPr>
+          <a:xfrm>
+            <a:off x="6400800" y="1737360"/>
+            <a:ext cx="5029200" cy="4572000"/>
+          </a:xfrm>
+          <a:prstGeom prst="rect">
+            <a:avLst/>
+          </a:prstGeom>
+          <a:noFill/>
+        </p:spPr>
+        <p:txBody>
+          <a:bodyPr wrap="square">
+            <a:spAutoFit/>
+          </a:bodyPr>
+          <a:lstStyle/>
+          <a:p>
+            <a:pPr>
+              <a:spcAft>
+                <a:spcPts val="600"/>
+              </a:spcAft>
+              <a:defRPr sz="1800">
+                <a:solidFill>
+                  <a:srgbClr val="333333"/>
+                </a:solidFill>
+              </a:defRPr>
+            </a:pPr>
+            <a:r>
+              <a:t>Define a 'tool' with your schema</a:t>
+            </a:r>
+          </a:p>
+          <a:p>
+            <a:pPr>
+              <a:spcAft>
+                <a:spcPts val="600"/>
+              </a:spcAft>
+              <a:defRPr sz="1800">
+                <a:solidFill>
+                  <a:srgbClr val="333333"/>
+                </a:solidFill>
+              </a:defRPr>
+            </a:pPr>
+            <a:r>
+              <a:t>Force tool_choice to that tool name</a:t>
+            </a:r>
+          </a:p>
+          <a:p>
+            <a:pPr>
+              <a:spcAft>
+                <a:spcPts val="600"/>
+              </a:spcAft>
+              <a:defRPr sz="1800">
+                <a:solidFill>
+                  <a:srgbClr val="333333"/>
+                </a:solidFill>
+              </a:defRPr>
+            </a:pPr>
+            <a:r>
+              <a:t>Model outputs structured data as tool input</a:t>
+            </a:r>
+          </a:p>
+          <a:p>
+            <a:pPr>
+              <a:spcAft>
+                <a:spcPts val="600"/>
+              </a:spcAft>
+              <a:defRPr sz="1800">
+                <a:solidFill>
+                  <a:srgbClr val="333333"/>
+                </a:solidFill>
+              </a:defRPr>
+            </a:pPr>
+            <a:r>
+              <a:t>Not 'real' tool use — just schema enforcement</a:t>
+            </a:r>
+          </a:p>
+          <a:p>
+            <a:pPr>
+              <a:spcAft>
+                <a:spcPts val="600"/>
+              </a:spcAft>
+              <a:defRPr sz="1800">
+                <a:solidFill>
+                  <a:srgbClr val="333333"/>
+                </a:solidFill>
+              </a:defRPr>
+            </a:pPr>
+            <a:r>
+              <a:t>Works reliably with Sonnet 4.6+</a:t>
             </a:r>
           </a:p>
         </p:txBody>
@@ -6202,17 +6888,9 @@
 </p:sld>
 </file>
 
-<file path=ppt/slides/slide7.xml><?xml version="1.0" encoding="utf-8"?>
+<file path=ppt/slides/slide5.xml><?xml version="1.0" encoding="utf-8"?>
 <p:sld xmlns:a="http://schemas.openxmlformats.org/drawingml/2006/main" xmlns:p="http://schemas.openxmlformats.org/presentationml/2006/main" xmlns:r="http://schemas.openxmlformats.org/officeDocument/2006/relationships">
   <p:cSld>
-    <p:bg>
-      <p:bgPr>
-        <a:solidFill>
-          <a:srgbClr val="FFFFFF"/>
-        </a:solidFill>
-        <a:effectLst/>
-      </p:bgPr>
-    </p:bg>
     <p:spTree>
       <p:nvGrpSpPr>
         <p:cNvPr id="1" name=""/>
@@ -6229,7 +6907,7 @@
         <p:spPr>
           <a:xfrm>
             <a:off x="0" y="0"/>
-            <a:ext cx="12191695" cy="54864"/>
+            <a:ext cx="12191695" cy="73152"/>
           </a:xfrm>
           <a:prstGeom prst="rect">
             <a:avLst/>
@@ -6272,7 +6950,7 @@
         <p:spPr>
           <a:xfrm>
             <a:off x="731520" y="274320"/>
-            <a:ext cx="10515600" cy="731520"/>
+            <a:ext cx="10728655" cy="731520"/>
           </a:xfrm>
           <a:prstGeom prst="rect">
             <a:avLst/>
@@ -6280,7 +6958,7 @@
           <a:noFill/>
         </p:spPr>
         <p:txBody>
-          <a:bodyPr wrap="square">
+          <a:bodyPr wrap="none">
             <a:spAutoFit/>
           </a:bodyPr>
           <a:lstStyle/>
@@ -6293,7 +6971,7 @@
               </a:defRPr>
             </a:pPr>
             <a:r>
-              <a:t>Anthropic &amp; Google Structured Output</a:t>
+              <a:t>OpenAI Structured Output</a:t>
             </a:r>
           </a:p>
         </p:txBody>
@@ -6306,8 +6984,8 @@
         </p:nvSpPr>
         <p:spPr>
           <a:xfrm>
-            <a:off x="548640" y="1188720"/>
-            <a:ext cx="10972800" cy="4754880"/>
+            <a:off x="731520" y="1188720"/>
+            <a:ext cx="10728655" cy="5212080"/>
           </a:xfrm>
           <a:prstGeom prst="roundRect">
             <a:avLst/>
@@ -6315,8 +6993,10 @@
           <a:solidFill>
             <a:srgbClr val="F0F0F0"/>
           </a:solidFill>
-          <a:ln>
-            <a:noFill/>
+          <a:ln w="12700">
+            <a:solidFill>
+              <a:srgbClr val="DDDDDD"/>
+            </a:solidFill>
           </a:ln>
         </p:spPr>
         <p:style>
@@ -6349,8 +7029,8 @@
         </p:nvSpPr>
         <p:spPr>
           <a:xfrm>
-            <a:off x="822960" y="1371600"/>
-            <a:ext cx="10424160" cy="4389120"/>
+            <a:off x="822960" y="1234440"/>
+            <a:ext cx="1828800" cy="320040"/>
           </a:xfrm>
           <a:prstGeom prst="rect">
             <a:avLst/>
@@ -6358,13 +7038,48 @@
           <a:noFill/>
         </p:spPr>
         <p:txBody>
+          <a:bodyPr wrap="none">
+            <a:spAutoFit/>
+          </a:bodyPr>
+          <a:lstStyle/>
+          <a:p>
+            <a:pPr>
+              <a:defRPr sz="1100" b="1">
+                <a:solidFill>
+                  <a:srgbClr val="666666"/>
+                </a:solidFill>
+              </a:defRPr>
+            </a:pPr>
+            <a:r>
+              <a:t>python</a:t>
+            </a:r>
+          </a:p>
+        </p:txBody>
+      </p:sp>
+      <p:sp>
+        <p:nvSpPr>
+          <p:cNvPr id="6" name="TextBox 5"/>
+          <p:cNvSpPr txBox="1"/>
+          <p:nvPr/>
+        </p:nvSpPr>
+        <p:spPr>
+          <a:xfrm>
+            <a:off x="914400" y="1554480"/>
+            <a:ext cx="10362895" cy="4754880"/>
+          </a:xfrm>
+          <a:prstGeom prst="rect">
+            <a:avLst/>
+          </a:prstGeom>
+          <a:noFill/>
+        </p:spPr>
+        <p:txBody>
           <a:bodyPr wrap="square">
             <a:spAutoFit/>
           </a:bodyPr>
           <a:lstStyle/>
           <a:p>
-            <a:pPr>
-              <a:defRPr sz="1200">
+            <a:pPr algn="l">
+              <a:defRPr sz="1300">
                 <a:solidFill>
                   <a:srgbClr val="333333"/>
                 </a:solidFill>
@@ -6372,105 +7087,53 @@
               </a:defRPr>
             </a:pPr>
             <a:r>
-              <a:t># ANTHROPIC — use tool use as structured output trick</a:t>
-            </a:r>
-            <a:br/>
-            <a:r>
-              <a:t>response = client.messages.create(</a:t>
-            </a:r>
-            <a:br/>
-            <a:r>
-              <a:t>    model="claude-sonnet-4-6-20250217",</a:t>
-            </a:r>
-            <a:br/>
-            <a:r>
-              <a:t>    max_tokens=1024,</a:t>
-            </a:r>
-            <a:br/>
-            <a:r>
-              <a:t>    tools=[{</a:t>
-            </a:r>
-            <a:br/>
-            <a:r>
-              <a:t>        "name": "extract_profile",</a:t>
-            </a:r>
-            <a:br/>
-            <a:r>
-              <a:t>        "description": "Extract user profile from text",</a:t>
-            </a:r>
-            <a:br/>
-            <a:r>
-              <a:t>        "input_schema": UserProfile.model_json_schema(),</a:t>
-            </a:r>
-            <a:br/>
-            <a:r>
-              <a:t>    }],</a:t>
-            </a:r>
-            <a:br/>
-            <a:r>
-              <a:t>    tool_choice={"type": "tool", "name": "extract_profile"},</a:t>
-            </a:r>
-            <a:br/>
-            <a:r>
-              <a:t>    messages=[{"role": "user", "content": "Alice is 30, knows Python..."}]</a:t>
-            </a:r>
-            <a:br/>
-            <a:r>
-              <a:t>)</a:t>
-            </a:r>
-            <a:br/>
-            <a:r>
-              <a:t>data = response.content[0].input  # dict matching schema</a:t>
-            </a:r>
-            <a:br/>
-            <a:r>
-              <a:t>profile = UserProfile(**data)</a:t>
+              <a:t>from pydantic import BaseModel, Field</a:t>
             </a:r>
             <a:br/>
             <a:br/>
             <a:r>
-              <a:t># GOOGLE — response_mime_type + response_schema</a:t>
+              <a:t>class ImageAnalysis(BaseModel):</a:t>
             </a:r>
             <a:br/>
             <a:r>
-              <a:t>response = google_client.models.generate_content(</a:t>
+              <a:t>    description: str = Field(description="One paragraph description")</a:t>
             </a:r>
             <a:br/>
             <a:r>
-              <a:t>    model="gemini-3-pro",</a:t>
+              <a:t>    mood: str = Field(description="happy, sad, neutral, etc.")</a:t>
             </a:r>
             <a:br/>
             <a:r>
-              <a:t>    contents="Alice is 30, knows Python...",</a:t>
-            </a:r>
-            <a:br/>
-            <a:r>
-              <a:t>    config={</a:t>
-            </a:r>
-            <a:br/>
-            <a:r>
-              <a:t>        "response_mime_type": "application/json",</a:t>
-            </a:r>
-            <a:br/>
-            <a:r>
-              <a:t>        "response_schema": UserProfile,</a:t>
-            </a:r>
-            <a:br/>
-            <a:r>
-              <a:t>    }</a:t>
-            </a:r>
-            <a:br/>
-            <a:r>
-              <a:t>)</a:t>
-            </a:r>
-            <a:br/>
-            <a:r>
-              <a:t>profile = UserProfile(**json.loads(response.text))</a:t>
+              <a:t>    objects: list[str] = Field(description="Objects detected")</a:t>
             </a:r>
             <a:br/>
             <a:br/>
             <a:r>
-              <a:t># KEY: Use Pydantic models everywhere — they work with all 3 providers</a:t>
+              <a:t>response = client.beta.chat.completions.parse(</a:t>
+            </a:r>
+            <a:br/>
+            <a:r>
+              <a:t>    model="gpt-4.1",</a:t>
+            </a:r>
+            <a:br/>
+            <a:r>
+              <a:t>    messages=[{"role": "user", "content": "Analyze this photo..."}],</a:t>
+            </a:r>
+            <a:br/>
+            <a:r>
+              <a:t>    response_format=ImageAnalysis,</a:t>
+            </a:r>
+            <a:br/>
+            <a:r>
+              <a:t>)</a:t>
+            </a:r>
+            <a:br/>
+            <a:r>
+              <a:t>result = response.choices[0].message.parsed  # Typed object!</a:t>
+            </a:r>
+            <a:br/>
+            <a:r>
+              <a:t>print(result.mood)  # Direct attribute access</a:t>
             </a:r>
           </a:p>
         </p:txBody>
@@ -6483,17 +7146,9 @@
 </p:sld>
 </file>
 
-<file path=ppt/slides/slide8.xml><?xml version="1.0" encoding="utf-8"?>
+<file path=ppt/slides/slide6.xml><?xml version="1.0" encoding="utf-8"?>
 <p:sld xmlns:a="http://schemas.openxmlformats.org/drawingml/2006/main" xmlns:p="http://schemas.openxmlformats.org/presentationml/2006/main" xmlns:r="http://schemas.openxmlformats.org/officeDocument/2006/relationships">
   <p:cSld>
-    <p:bg>
-      <p:bgPr>
-        <a:solidFill>
-          <a:srgbClr val="FFFFFF"/>
-        </a:solidFill>
-        <a:effectLst/>
-      </p:bgPr>
-    </p:bg>
     <p:spTree>
       <p:nvGrpSpPr>
         <p:cNvPr id="1" name=""/>
@@ -6510,7 +7165,7 @@
         <p:spPr>
           <a:xfrm>
             <a:off x="0" y="0"/>
-            <a:ext cx="12191695" cy="54864"/>
+            <a:ext cx="12191695" cy="73152"/>
           </a:xfrm>
           <a:prstGeom prst="rect">
             <a:avLst/>
@@ -6553,7 +7208,7 @@
         <p:spPr>
           <a:xfrm>
             <a:off x="731520" y="274320"/>
-            <a:ext cx="10515600" cy="731520"/>
+            <a:ext cx="10728655" cy="731520"/>
           </a:xfrm>
           <a:prstGeom prst="rect">
             <a:avLst/>
@@ -6561,7 +7216,7 @@
           <a:noFill/>
         </p:spPr>
         <p:txBody>
-          <a:bodyPr wrap="square">
+          <a:bodyPr wrap="none">
             <a:spAutoFit/>
           </a:bodyPr>
           <a:lstStyle/>
@@ -6574,7 +7229,7 @@
               </a:defRPr>
             </a:pPr>
             <a:r>
-              <a:t>Production Pydantic Schema Patterns</a:t>
+              <a:t>Anthropic Structured Output (Tool-Use Pattern)</a:t>
             </a:r>
           </a:p>
         </p:txBody>
@@ -6587,8 +7242,8 @@
         </p:nvSpPr>
         <p:spPr>
           <a:xfrm>
-            <a:off x="548640" y="1188720"/>
-            <a:ext cx="10972800" cy="4754880"/>
+            <a:off x="731520" y="1188720"/>
+            <a:ext cx="10728655" cy="5212080"/>
           </a:xfrm>
           <a:prstGeom prst="roundRect">
             <a:avLst/>
@@ -6596,8 +7251,10 @@
           <a:solidFill>
             <a:srgbClr val="F0F0F0"/>
           </a:solidFill>
-          <a:ln>
-            <a:noFill/>
+          <a:ln w="12700">
+            <a:solidFill>
+              <a:srgbClr val="DDDDDD"/>
+            </a:solidFill>
           </a:ln>
         </p:spPr>
         <p:style>
@@ -6630,8 +7287,8 @@
         </p:nvSpPr>
         <p:spPr>
           <a:xfrm>
-            <a:off x="822960" y="1371600"/>
-            <a:ext cx="10424160" cy="4389120"/>
+            <a:off x="822960" y="1234440"/>
+            <a:ext cx="1828800" cy="320040"/>
           </a:xfrm>
           <a:prstGeom prst="rect">
             <a:avLst/>
@@ -6639,13 +7296,48 @@
           <a:noFill/>
         </p:spPr>
         <p:txBody>
+          <a:bodyPr wrap="none">
+            <a:spAutoFit/>
+          </a:bodyPr>
+          <a:lstStyle/>
+          <a:p>
+            <a:pPr>
+              <a:defRPr sz="1100" b="1">
+                <a:solidFill>
+                  <a:srgbClr val="666666"/>
+                </a:solidFill>
+              </a:defRPr>
+            </a:pPr>
+            <a:r>
+              <a:t>python</a:t>
+            </a:r>
+          </a:p>
+        </p:txBody>
+      </p:sp>
+      <p:sp>
+        <p:nvSpPr>
+          <p:cNvPr id="6" name="TextBox 5"/>
+          <p:cNvSpPr txBox="1"/>
+          <p:nvPr/>
+        </p:nvSpPr>
+        <p:spPr>
+          <a:xfrm>
+            <a:off x="914400" y="1554480"/>
+            <a:ext cx="10362895" cy="4754880"/>
+          </a:xfrm>
+          <a:prstGeom prst="rect">
+            <a:avLst/>
+          </a:prstGeom>
+          <a:noFill/>
+        </p:spPr>
+        <p:txBody>
           <a:bodyPr wrap="square">
             <a:spAutoFit/>
           </a:bodyPr>
           <a:lstStyle/>
           <a:p>
-            <a:pPr>
-              <a:defRPr sz="1200">
+            <a:pPr algn="l">
+              <a:defRPr sz="1300">
                 <a:solidFill>
                   <a:srgbClr val="333333"/>
                 </a:solidFill>
@@ -6653,91 +7345,55 @@
               </a:defRPr>
             </a:pPr>
             <a:r>
-              <a:t>from pydantic import BaseModel, Field</a:t>
+              <a:t>response = client.messages.create(</a:t>
             </a:r>
             <a:br/>
             <a:r>
-              <a:t>from enum import Enum</a:t>
+              <a:t>    model="claude-sonnet-4-6-20250217",</a:t>
             </a:r>
             <a:br/>
             <a:r>
-              <a:t>from typing import Optional</a:t>
+              <a:t>    max_tokens=1024,</a:t>
             </a:r>
             <a:br/>
+            <a:r>
+              <a:t>    tools=[{</a:t>
+            </a:r>
             <a:br/>
             <a:r>
-              <a:t>class Sentiment(str, Enum):</a:t>
+              <a:t>        "name": "analyze_image",</a:t>
             </a:r>
             <a:br/>
             <a:r>
-              <a:t>    POSITIVE = "positive"</a:t>
+              <a:t>        "description": "Extract structured analysis",</a:t>
             </a:r>
             <a:br/>
             <a:r>
-              <a:t>    NEGATIVE = "negative"</a:t>
+              <a:t>        "input_schema": ImageAnalysis.model_json_schema(),</a:t>
             </a:r>
             <a:br/>
             <a:r>
-              <a:t>    NEUTRAL = "neutral"</a:t>
+              <a:t>    }],</a:t>
             </a:r>
             <a:br/>
+            <a:r>
+              <a:t>    tool_choice={"type": "tool", "name": "analyze_image"},</a:t>
+            </a:r>
             <a:br/>
             <a:r>
-              <a:t>class Entity(BaseModel):</a:t>
+              <a:t>    messages=[{"role": "user", "content": "Analyze this photo..."}],</a:t>
             </a:r>
             <a:br/>
             <a:r>
-              <a:t>    name: str = Field(description="The entity name")</a:t>
+              <a:t>)</a:t>
             </a:r>
             <a:br/>
             <a:r>
-              <a:t>    type: str = Field(description="PERSON, ORG, or LOCATION")</a:t>
+              <a:t>data = response.content[0].input  # Dict matching schema</a:t>
             </a:r>
             <a:br/>
             <a:r>
-              <a:t>    confidence: float = Field(ge=0, le=1, description="0-1 confidence")</a:t>
-            </a:r>
-            <a:br/>
-            <a:br/>
-            <a:r>
-              <a:t>class AnalysisResult(BaseModel):</a:t>
-            </a:r>
-            <a:br/>
-            <a:r>
-              <a:t>    summary: str = Field(description="One-sentence summary")</a:t>
-            </a:r>
-            <a:br/>
-            <a:r>
-              <a:t>    sentiment: Sentiment                    # Enum constrains values</a:t>
-            </a:r>
-            <a:br/>
-            <a:r>
-              <a:t>    entities: list[Entity]                  # Nested models</a:t>
-            </a:r>
-            <a:br/>
-            <a:r>
-              <a:t>    key_topics: list[str] = Field(max_length=5)</a:t>
-            </a:r>
-            <a:br/>
-            <a:r>
-              <a:t>    language: str = Field(description="ISO 639-1 code")</a:t>
-            </a:r>
-            <a:br/>
-            <a:r>
-              <a:t>    contains_pii: bool</a:t>
-            </a:r>
-            <a:br/>
-            <a:r>
-              <a:t>    pii_types: Optional[list[str]] = None   # Optional fields</a:t>
-            </a:r>
-            <a:br/>
-            <a:br/>
-            <a:r>
-              <a:t># Field descriptions help the model understand what you want</a:t>
-            </a:r>
-            <a:br/>
-            <a:r>
-              <a:t># Enums constrain to fixed sets — Pydantic validates automatically</a:t>
+              <a:t>result = ImageAnalysis(**data)</a:t>
             </a:r>
           </a:p>
         </p:txBody>
@@ -6750,17 +7406,9 @@
 </p:sld>
 </file>
 
-<file path=ppt/slides/slide9.xml><?xml version="1.0" encoding="utf-8"?>
+<file path=ppt/slides/slide7.xml><?xml version="1.0" encoding="utf-8"?>
 <p:sld xmlns:a="http://schemas.openxmlformats.org/drawingml/2006/main" xmlns:p="http://schemas.openxmlformats.org/presentationml/2006/main" xmlns:r="http://schemas.openxmlformats.org/officeDocument/2006/relationships">
   <p:cSld>
-    <p:bg>
-      <p:bgPr>
-        <a:solidFill>
-          <a:srgbClr val="FFFFFF"/>
-        </a:solidFill>
-        <a:effectLst/>
-      </p:bgPr>
-    </p:bg>
     <p:spTree>
       <p:nvGrpSpPr>
         <p:cNvPr id="1" name=""/>
@@ -6777,7 +7425,7 @@
         <p:spPr>
           <a:xfrm>
             <a:off x="0" y="0"/>
-            <a:ext cx="12191695" cy="54864"/>
+            <a:ext cx="12191695" cy="73152"/>
           </a:xfrm>
           <a:prstGeom prst="rect">
             <a:avLst/>
@@ -6820,7 +7468,7 @@
         <p:spPr>
           <a:xfrm>
             <a:off x="731520" y="274320"/>
-            <a:ext cx="10515600" cy="731520"/>
+            <a:ext cx="10728655" cy="731520"/>
           </a:xfrm>
           <a:prstGeom prst="rect">
             <a:avLst/>
@@ -6828,7 +7476,7 @@
           <a:noFill/>
         </p:spPr>
         <p:txBody>
-          <a:bodyPr wrap="square">
+          <a:bodyPr wrap="none">
             <a:spAutoFit/>
           </a:bodyPr>
           <a:lstStyle/>
@@ -6841,7 +7489,7 @@
               </a:defRPr>
             </a:pPr>
             <a:r>
-              <a:t>Vision — Send Images to All 3 Providers</a:t>
+              <a:t>Google Gemini Structured Output</a:t>
             </a:r>
           </a:p>
         </p:txBody>
@@ -6854,8 +7502,8 @@
         </p:nvSpPr>
         <p:spPr>
           <a:xfrm>
-            <a:off x="548640" y="1188720"/>
-            <a:ext cx="10972800" cy="4754880"/>
+            <a:off x="731520" y="1188720"/>
+            <a:ext cx="10728655" cy="5212080"/>
           </a:xfrm>
           <a:prstGeom prst="roundRect">
             <a:avLst/>
@@ -6863,8 +7511,10 @@
           <a:solidFill>
             <a:srgbClr val="F0F0F0"/>
           </a:solidFill>
-          <a:ln>
-            <a:noFill/>
+          <a:ln w="12700">
+            <a:solidFill>
+              <a:srgbClr val="DDDDDD"/>
+            </a:solidFill>
           </a:ln>
         </p:spPr>
         <p:style>
@@ -6897,8 +7547,8 @@
         </p:nvSpPr>
         <p:spPr>
           <a:xfrm>
-            <a:off x="822960" y="1371600"/>
-            <a:ext cx="10424160" cy="4389120"/>
+            <a:off x="822960" y="1234440"/>
+            <a:ext cx="1828800" cy="320040"/>
           </a:xfrm>
           <a:prstGeom prst="rect">
             <a:avLst/>
@@ -6906,115 +7556,567 @@
           <a:noFill/>
         </p:spPr>
         <p:txBody>
+          <a:bodyPr wrap="none">
+            <a:spAutoFit/>
+          </a:bodyPr>
+          <a:lstStyle/>
+          <a:p>
+            <a:pPr>
+              <a:defRPr sz="1100" b="1">
+                <a:solidFill>
+                  <a:srgbClr val="666666"/>
+                </a:solidFill>
+              </a:defRPr>
+            </a:pPr>
+            <a:r>
+              <a:t>python</a:t>
+            </a:r>
+          </a:p>
+        </p:txBody>
+      </p:sp>
+      <p:sp>
+        <p:nvSpPr>
+          <p:cNvPr id="6" name="TextBox 5"/>
+          <p:cNvSpPr txBox="1"/>
+          <p:nvPr/>
+        </p:nvSpPr>
+        <p:spPr>
+          <a:xfrm>
+            <a:off x="914400" y="1554480"/>
+            <a:ext cx="10362895" cy="4754880"/>
+          </a:xfrm>
+          <a:prstGeom prst="rect">
+            <a:avLst/>
+          </a:prstGeom>
+          <a:noFill/>
+        </p:spPr>
+        <p:txBody>
           <a:bodyPr wrap="square">
             <a:spAutoFit/>
           </a:bodyPr>
           <a:lstStyle/>
           <a:p>
+            <a:pPr algn="l">
+              <a:defRPr sz="1300">
+                <a:solidFill>
+                  <a:srgbClr val="333333"/>
+                </a:solidFill>
+                <a:latin typeface="Consolas"/>
+              </a:defRPr>
+            </a:pPr>
+            <a:r>
+              <a:t>response = client.models.generate_content(</a:t>
+            </a:r>
+            <a:br/>
+            <a:r>
+              <a:t>    model="gemini-2.5-flash",</a:t>
+            </a:r>
+            <a:br/>
+            <a:r>
+              <a:t>    contents="Analyze this photo...",</a:t>
+            </a:r>
+            <a:br/>
+            <a:r>
+              <a:t>    config={</a:t>
+            </a:r>
+            <a:br/>
+            <a:r>
+              <a:t>        "response_mime_type": "application/json",</a:t>
+            </a:r>
+            <a:br/>
+            <a:r>
+              <a:t>        "response_schema": ImageAnalysis,  # Pydantic model</a:t>
+            </a:r>
+            <a:br/>
+            <a:r>
+              <a:t>    },</a:t>
+            </a:r>
+            <a:br/>
+            <a:r>
+              <a:t>)</a:t>
+            </a:r>
+            <a:br/>
+            <a:r>
+              <a:t>result = ImageAnalysis(**json.loads(response.text))</a:t>
+            </a:r>
+          </a:p>
+        </p:txBody>
+      </p:sp>
+    </p:spTree>
+  </p:cSld>
+  <p:clrMapOvr>
+    <a:masterClrMapping/>
+  </p:clrMapOvr>
+</p:sld>
+</file>
+
+<file path=ppt/slides/slide8.xml><?xml version="1.0" encoding="utf-8"?>
+<p:sld xmlns:a="http://schemas.openxmlformats.org/drawingml/2006/main" xmlns:p="http://schemas.openxmlformats.org/presentationml/2006/main" xmlns:r="http://schemas.openxmlformats.org/officeDocument/2006/relationships">
+  <p:cSld>
+    <p:spTree>
+      <p:nvGrpSpPr>
+        <p:cNvPr id="1" name=""/>
+        <p:cNvGrpSpPr/>
+        <p:nvPr/>
+      </p:nvGrpSpPr>
+      <p:grpSpPr/>
+      <p:sp>
+        <p:nvSpPr>
+          <p:cNvPr id="2" name="Rectangle 1"/>
+          <p:cNvSpPr/>
+          <p:nvPr/>
+        </p:nvSpPr>
+        <p:spPr>
+          <a:xfrm>
+            <a:off x="0" y="0"/>
+            <a:ext cx="12191695" cy="73152"/>
+          </a:xfrm>
+          <a:prstGeom prst="rect">
+            <a:avLst/>
+          </a:prstGeom>
+          <a:solidFill>
+            <a:srgbClr val="0096D6"/>
+          </a:solidFill>
+          <a:ln>
+            <a:noFill/>
+          </a:ln>
+        </p:spPr>
+        <p:style>
+          <a:lnRef idx="1">
+            <a:schemeClr val="accent1"/>
+          </a:lnRef>
+          <a:fillRef idx="3">
+            <a:schemeClr val="accent1"/>
+          </a:fillRef>
+          <a:effectRef idx="2">
+            <a:schemeClr val="accent1"/>
+          </a:effectRef>
+          <a:fontRef idx="minor">
+            <a:schemeClr val="lt1"/>
+          </a:fontRef>
+        </p:style>
+        <p:txBody>
+          <a:bodyPr rtlCol="0" anchor="ctr"/>
+          <a:lstStyle/>
+          <a:p>
+            <a:pPr algn="ctr"/>
+          </a:p>
+        </p:txBody>
+      </p:sp>
+      <p:sp>
+        <p:nvSpPr>
+          <p:cNvPr id="3" name="TextBox 2"/>
+          <p:cNvSpPr txBox="1"/>
+          <p:nvPr/>
+        </p:nvSpPr>
+        <p:spPr>
+          <a:xfrm>
+            <a:off x="731520" y="274320"/>
+            <a:ext cx="10728655" cy="822960"/>
+          </a:xfrm>
+          <a:prstGeom prst="rect">
+            <a:avLst/>
+          </a:prstGeom>
+          <a:noFill/>
+        </p:spPr>
+        <p:txBody>
+          <a:bodyPr wrap="square">
+            <a:spAutoFit/>
+          </a:bodyPr>
+          <a:lstStyle/>
+          <a:p>
+            <a:pPr algn="l">
+              <a:defRPr sz="3200" b="1">
+                <a:solidFill>
+                  <a:srgbClr val="1B2A4A"/>
+                </a:solidFill>
+              </a:defRPr>
+            </a:pPr>
+            <a:r>
+              <a:t>Vision APIs — Sending Images to LLMs</a:t>
+            </a:r>
+          </a:p>
+        </p:txBody>
+      </p:sp>
+      <p:sp>
+        <p:nvSpPr>
+          <p:cNvPr id="4" name="TextBox 3"/>
+          <p:cNvSpPr txBox="1"/>
+          <p:nvPr/>
+        </p:nvSpPr>
+        <p:spPr>
+          <a:xfrm>
+            <a:off x="914400" y="1280160"/>
+            <a:ext cx="10362895" cy="5029200"/>
+          </a:xfrm>
+          <a:prstGeom prst="rect">
+            <a:avLst/>
+          </a:prstGeom>
+          <a:noFill/>
+        </p:spPr>
+        <p:txBody>
+          <a:bodyPr wrap="square">
+            <a:spAutoFit/>
+          </a:bodyPr>
+          <a:lstStyle/>
+          <a:p>
             <a:pPr>
-              <a:defRPr sz="1200">
+              <a:spcBef>
+                <a:spcPts val="400"/>
+              </a:spcBef>
+              <a:spcAft>
+                <a:spcPts val="800"/>
+              </a:spcAft>
+              <a:defRPr sz="2000">
                 <a:solidFill>
                   <a:srgbClr val="333333"/>
                 </a:solidFill>
+              </a:defRPr>
+            </a:pPr>
+            <a:r>
+              <a:t>All major models now support vision (image understanding)</a:t>
+            </a:r>
+          </a:p>
+          <a:p>
+            <a:pPr>
+              <a:spcBef>
+                <a:spcPts val="400"/>
+              </a:spcBef>
+              <a:spcAft>
+                <a:spcPts val="800"/>
+              </a:spcAft>
+              <a:defRPr sz="2000">
+                <a:solidFill>
+                  <a:srgbClr val="333333"/>
+                </a:solidFill>
+              </a:defRPr>
+            </a:pPr>
+            <a:r>
+              <a:t>OpenAI: image_url in content array (base64 or URL)</a:t>
+            </a:r>
+          </a:p>
+          <a:p>
+            <a:pPr>
+              <a:spcBef>
+                <a:spcPts val="400"/>
+              </a:spcBef>
+              <a:spcAft>
+                <a:spcPts val="800"/>
+              </a:spcAft>
+              <a:defRPr sz="2000">
+                <a:solidFill>
+                  <a:srgbClr val="333333"/>
+                </a:solidFill>
+              </a:defRPr>
+            </a:pPr>
+            <a:r>
+              <a:t>Anthropic: image source block (base64 + media_type)</a:t>
+            </a:r>
+          </a:p>
+          <a:p>
+            <a:pPr>
+              <a:spcBef>
+                <a:spcPts val="400"/>
+              </a:spcBef>
+              <a:spcAft>
+                <a:spcPts val="800"/>
+              </a:spcAft>
+              <a:defRPr sz="2000">
+                <a:solidFill>
+                  <a:srgbClr val="333333"/>
+                </a:solidFill>
+              </a:defRPr>
+            </a:pPr>
+            <a:r>
+              <a:t>Google: Part.from_bytes(data=bytes, mime_type=...)</a:t>
+            </a:r>
+          </a:p>
+          <a:p>
+            <a:pPr>
+              <a:spcBef>
+                <a:spcPts val="400"/>
+              </a:spcBef>
+              <a:spcAft>
+                <a:spcPts val="800"/>
+              </a:spcAft>
+              <a:defRPr sz="2000">
+                <a:solidFill>
+                  <a:srgbClr val="333333"/>
+                </a:solidFill>
+              </a:defRPr>
+            </a:pPr>
+            <a:r>
+              <a:t>Best vision: GPT-4.1, Sonnet 4.6, Gemini 2.5 Pro</a:t>
+            </a:r>
+          </a:p>
+          <a:p>
+            <a:pPr>
+              <a:spcBef>
+                <a:spcPts val="400"/>
+              </a:spcBef>
+              <a:spcAft>
+                <a:spcPts val="800"/>
+              </a:spcAft>
+              <a:defRPr sz="2000">
+                <a:solidFill>
+                  <a:srgbClr val="333333"/>
+                </a:solidFill>
+              </a:defRPr>
+            </a:pPr>
+            <a:r>
+              <a:t>Use cases: OCR, analysis, accessibility, data extraction</a:t>
+            </a:r>
+          </a:p>
+        </p:txBody>
+      </p:sp>
+    </p:spTree>
+  </p:cSld>
+  <p:clrMapOvr>
+    <a:masterClrMapping/>
+  </p:clrMapOvr>
+</p:sld>
+</file>
+
+<file path=ppt/slides/slide9.xml><?xml version="1.0" encoding="utf-8"?>
+<p:sld xmlns:a="http://schemas.openxmlformats.org/drawingml/2006/main" xmlns:p="http://schemas.openxmlformats.org/presentationml/2006/main" xmlns:r="http://schemas.openxmlformats.org/officeDocument/2006/relationships">
+  <p:cSld>
+    <p:spTree>
+      <p:nvGrpSpPr>
+        <p:cNvPr id="1" name=""/>
+        <p:cNvGrpSpPr/>
+        <p:nvPr/>
+      </p:nvGrpSpPr>
+      <p:grpSpPr/>
+      <p:sp>
+        <p:nvSpPr>
+          <p:cNvPr id="2" name="Rectangle 1"/>
+          <p:cNvSpPr/>
+          <p:nvPr/>
+        </p:nvSpPr>
+        <p:spPr>
+          <a:xfrm>
+            <a:off x="0" y="0"/>
+            <a:ext cx="12191695" cy="73152"/>
+          </a:xfrm>
+          <a:prstGeom prst="rect">
+            <a:avLst/>
+          </a:prstGeom>
+          <a:solidFill>
+            <a:srgbClr val="0096D6"/>
+          </a:solidFill>
+          <a:ln>
+            <a:noFill/>
+          </a:ln>
+        </p:spPr>
+        <p:style>
+          <a:lnRef idx="1">
+            <a:schemeClr val="accent1"/>
+          </a:lnRef>
+          <a:fillRef idx="3">
+            <a:schemeClr val="accent1"/>
+          </a:fillRef>
+          <a:effectRef idx="2">
+            <a:schemeClr val="accent1"/>
+          </a:effectRef>
+          <a:fontRef idx="minor">
+            <a:schemeClr val="lt1"/>
+          </a:fontRef>
+        </p:style>
+        <p:txBody>
+          <a:bodyPr rtlCol="0" anchor="ctr"/>
+          <a:lstStyle/>
+          <a:p>
+            <a:pPr algn="ctr"/>
+          </a:p>
+        </p:txBody>
+      </p:sp>
+      <p:sp>
+        <p:nvSpPr>
+          <p:cNvPr id="3" name="TextBox 2"/>
+          <p:cNvSpPr txBox="1"/>
+          <p:nvPr/>
+        </p:nvSpPr>
+        <p:spPr>
+          <a:xfrm>
+            <a:off x="731520" y="274320"/>
+            <a:ext cx="10728655" cy="731520"/>
+          </a:xfrm>
+          <a:prstGeom prst="rect">
+            <a:avLst/>
+          </a:prstGeom>
+          <a:noFill/>
+        </p:spPr>
+        <p:txBody>
+          <a:bodyPr wrap="none">
+            <a:spAutoFit/>
+          </a:bodyPr>
+          <a:lstStyle/>
+          <a:p>
+            <a:pPr>
+              <a:defRPr sz="2800" b="1">
+                <a:solidFill>
+                  <a:srgbClr val="1B2A4A"/>
+                </a:solidFill>
+              </a:defRPr>
+            </a:pPr>
+            <a:r>
+              <a:t>Vision — OpenAI (GPT-4.1)</a:t>
+            </a:r>
+          </a:p>
+        </p:txBody>
+      </p:sp>
+      <p:sp>
+        <p:nvSpPr>
+          <p:cNvPr id="4" name="Rounded Rectangle 3"/>
+          <p:cNvSpPr/>
+          <p:nvPr/>
+        </p:nvSpPr>
+        <p:spPr>
+          <a:xfrm>
+            <a:off x="731520" y="1188720"/>
+            <a:ext cx="10728655" cy="5212080"/>
+          </a:xfrm>
+          <a:prstGeom prst="roundRect">
+            <a:avLst/>
+          </a:prstGeom>
+          <a:solidFill>
+            <a:srgbClr val="F0F0F0"/>
+          </a:solidFill>
+          <a:ln w="12700">
+            <a:solidFill>
+              <a:srgbClr val="DDDDDD"/>
+            </a:solidFill>
+          </a:ln>
+        </p:spPr>
+        <p:style>
+          <a:lnRef idx="1">
+            <a:schemeClr val="accent1"/>
+          </a:lnRef>
+          <a:fillRef idx="3">
+            <a:schemeClr val="accent1"/>
+          </a:fillRef>
+          <a:effectRef idx="2">
+            <a:schemeClr val="accent1"/>
+          </a:effectRef>
+          <a:fontRef idx="minor">
+            <a:schemeClr val="lt1"/>
+          </a:fontRef>
+        </p:style>
+        <p:txBody>
+          <a:bodyPr rtlCol="0" anchor="ctr"/>
+          <a:lstStyle/>
+          <a:p>
+            <a:pPr algn="ctr"/>
+          </a:p>
+        </p:txBody>
+      </p:sp>
+      <p:sp>
+        <p:nvSpPr>
+          <p:cNvPr id="5" name="TextBox 4"/>
+          <p:cNvSpPr txBox="1"/>
+          <p:nvPr/>
+        </p:nvSpPr>
+        <p:spPr>
+          <a:xfrm>
+            <a:off x="822960" y="1234440"/>
+            <a:ext cx="1828800" cy="320040"/>
+          </a:xfrm>
+          <a:prstGeom prst="rect">
+            <a:avLst/>
+          </a:prstGeom>
+          <a:noFill/>
+        </p:spPr>
+        <p:txBody>
+          <a:bodyPr wrap="none">
+            <a:spAutoFit/>
+          </a:bodyPr>
+          <a:lstStyle/>
+          <a:p>
+            <a:pPr>
+              <a:defRPr sz="1100" b="1">
+                <a:solidFill>
+                  <a:srgbClr val="666666"/>
+                </a:solidFill>
+              </a:defRPr>
+            </a:pPr>
+            <a:r>
+              <a:t>python</a:t>
+            </a:r>
+          </a:p>
+        </p:txBody>
+      </p:sp>
+      <p:sp>
+        <p:nvSpPr>
+          <p:cNvPr id="6" name="TextBox 5"/>
+          <p:cNvSpPr txBox="1"/>
+          <p:nvPr/>
+        </p:nvSpPr>
+        <p:spPr>
+          <a:xfrm>
+            <a:off x="914400" y="1554480"/>
+            <a:ext cx="10362895" cy="4754880"/>
+          </a:xfrm>
+          <a:prstGeom prst="rect">
+            <a:avLst/>
+          </a:prstGeom>
+          <a:noFill/>
+        </p:spPr>
+        <p:txBody>
+          <a:bodyPr wrap="square">
+            <a:spAutoFit/>
+          </a:bodyPr>
+          <a:lstStyle/>
+          <a:p>
+            <a:pPr algn="l">
+              <a:defRPr sz="1300">
+                <a:solidFill>
+                  <a:srgbClr val="333333"/>
+                </a:solidFill>
                 <a:latin typeface="Consolas"/>
               </a:defRPr>
             </a:pPr>
             <a:r>
-              <a:t># OPENAI — base64 in message content</a:t>
+              <a:t>response = client.chat.completions.create(</a:t>
             </a:r>
             <a:br/>
             <a:r>
-              <a:t>response = client.chat.completions.create(</a:t>
+              <a:t>    model="gpt-4.1",</a:t>
             </a:r>
             <a:br/>
             <a:r>
-              <a:t>    model="gpt-5.2",</a:t>
+              <a:t>    messages=[{</a:t>
             </a:r>
             <a:br/>
             <a:r>
-              <a:t>    messages=[{"role": "user", "content": [</a:t>
+              <a:t>        "role": "user",</a:t>
             </a:r>
             <a:br/>
             <a:r>
-              <a:t>        {"type": "text", "text": "What's in this image?"},</a:t>
+              <a:t>        "content": [</a:t>
             </a:r>
             <a:br/>
             <a:r>
-              <a:t>        {"type": "image_url", "image_url": {</a:t>
+              <a:t>            {"type": "text", "text": "Describe this image"},</a:t>
             </a:r>
             <a:br/>
             <a:r>
-              <a:t>            "url": f"data:image/jpeg;base64,{encode_image('photo.jpg')}"</a:t>
+              <a:t>            {"type": "image_url", "image_url": {</a:t>
             </a:r>
             <a:br/>
             <a:r>
-              <a:t>        }}</a:t>
+              <a:t>                "url": f"data:image/jpeg;base64,{b64_image}"</a:t>
             </a:r>
             <a:br/>
             <a:r>
-              <a:t>    ]}]</a:t>
+              <a:t>            }},</a:t>
             </a:r>
             <a:br/>
             <a:r>
-              <a:t>)</a:t>
+              <a:t>        ],</a:t>
             </a:r>
             <a:br/>
-            <a:br/>
-            <a:r>
-              <a:t># ANTHROPIC — image block in content</a:t>
-            </a:r>
-            <a:br/>
-            <a:r>
-              <a:t>response = anthropic_client.messages.create(</a:t>
-            </a:r>
-            <a:br/>
-            <a:r>
-              <a:t>    model="claude-sonnet-4-6-20250217", max_tokens=1024,</a:t>
-            </a:r>
-            <a:br/>
-            <a:r>
-              <a:t>    messages=[{"role": "user", "content": [</a:t>
-            </a:r>
-            <a:br/>
-            <a:r>
-              <a:t>        {"type": "image", "source": {"type": "base64",</a:t>
-            </a:r>
-            <a:br/>
-            <a:r>
-              <a:t>            "media_type": "image/jpeg", "data": encode_image("photo.jpg")}},</a:t>
-            </a:r>
-            <a:br/>
-            <a:r>
-              <a:t>        {"type": "text", "text": "What's in this image?"},</a:t>
-            </a:r>
-            <a:br/>
-            <a:r>
-              <a:t>    ]}]</a:t>
-            </a:r>
-            <a:br/>
-            <a:r>
-              <a:t>)</a:t>
-            </a:r>
-            <a:br/>
-            <a:br/>
-            <a:r>
-              <a:t># GOOGLE — simplest (native multimodal — text+image+audio+video)</a:t>
-            </a:r>
-            <a:br/>
-            <a:r>
-              <a:t>response = google_client.models.generate_content(</a:t>
-            </a:r>
-            <a:br/>
-            <a:r>
-              <a:t>    model="gemini-3-pro",</a:t>
-            </a:r>
-            <a:br/>
-            <a:r>
-              <a:t>    contents=[Part.from_bytes(data=Path("photo.jpg").read_bytes(),</a:t>
-            </a:r>
-            <a:br/>
-            <a:r>
-              <a:t>              mime_type="image/jpeg"), "What's in this image?"]</a:t>
+            <a:r>
+              <a:t>    }],</a:t>
             </a:r>
             <a:br/>
             <a:r>

</xml_diff>